<commit_message>
GPS Performed: This is a fast git push, minor changes have been made and I didn't feel the need to commit a message.
</commit_message>
<xml_diff>
--- a/Presentation.pptx
+++ b/Presentation.pptx
@@ -13,19 +13,17 @@
     <p:sldId id="265" r:id="rId7"/>
     <p:sldId id="267" r:id="rId8"/>
     <p:sldId id="259" r:id="rId9"/>
-    <p:sldId id="260" r:id="rId10"/>
-    <p:sldId id="268" r:id="rId11"/>
-    <p:sldId id="269" r:id="rId12"/>
-    <p:sldId id="261" r:id="rId13"/>
-    <p:sldId id="266" r:id="rId14"/>
-    <p:sldId id="262" r:id="rId15"/>
-    <p:sldId id="270" r:id="rId16"/>
-    <p:sldId id="271" r:id="rId17"/>
-    <p:sldId id="272" r:id="rId18"/>
-    <p:sldId id="273" r:id="rId19"/>
-    <p:sldId id="264" r:id="rId20"/>
-    <p:sldId id="277" r:id="rId21"/>
-    <p:sldId id="274" r:id="rId22"/>
+    <p:sldId id="268" r:id="rId10"/>
+    <p:sldId id="261" r:id="rId11"/>
+    <p:sldId id="266" r:id="rId12"/>
+    <p:sldId id="262" r:id="rId13"/>
+    <p:sldId id="270" r:id="rId14"/>
+    <p:sldId id="271" r:id="rId15"/>
+    <p:sldId id="272" r:id="rId16"/>
+    <p:sldId id="273" r:id="rId17"/>
+    <p:sldId id="264" r:id="rId18"/>
+    <p:sldId id="277" r:id="rId19"/>
+    <p:sldId id="274" r:id="rId20"/>
   </p:sldIdLst>
   <p:sldSz cx="9144000" cy="6858000" type="screen4x3"/>
   <p:notesSz cx="6858000" cy="9144000"/>
@@ -126,7 +124,7 @@
   </p:defaultTextStyle>
   <p:extLst>
     <p:ext uri="{EFAFB233-063F-42B5-8137-9DF3F51BA10A}">
-      <p15:sldGuideLst xmlns="" xmlns:p15="http://schemas.microsoft.com/office/powerpoint/2012/main">
+      <p15:sldGuideLst xmlns:p15="http://schemas.microsoft.com/office/powerpoint/2012/main">
         <p15:guide id="1" orient="horz" pos="2160">
           <p15:clr>
             <a:srgbClr val="A4A3A4"/>
@@ -760,7 +758,7 @@
           <a:p>
             <a:fld id="{3D636C07-7E76-46D3-B86B-6AF7C60E533E}" type="datetimeFigureOut">
               <a:rPr lang="nl-NL" smtClean="0"/>
-              <a:t>8-11-2020</a:t>
+              <a:t>08-11-2020</a:t>
             </a:fld>
             <a:endParaRPr lang="nl-NL"/>
           </a:p>
@@ -822,7 +820,7 @@
           <a:p>
             <a:fld id="{A9096D49-DAE3-40DE-93E0-41688E0A5016}" type="slidenum">
               <a:rPr lang="nl-NL" smtClean="0"/>
-              <a:t>‹nr.›</a:t>
+              <a:t>‹#›</a:t>
             </a:fld>
             <a:endParaRPr lang="nl-NL"/>
           </a:p>
@@ -950,7 +948,7 @@
           <a:p>
             <a:fld id="{3D636C07-7E76-46D3-B86B-6AF7C60E533E}" type="datetimeFigureOut">
               <a:rPr lang="nl-NL" smtClean="0"/>
-              <a:t>8-11-2020</a:t>
+              <a:t>08-11-2020</a:t>
             </a:fld>
             <a:endParaRPr lang="nl-NL"/>
           </a:p>
@@ -992,7 +990,7 @@
           <a:p>
             <a:fld id="{A9096D49-DAE3-40DE-93E0-41688E0A5016}" type="slidenum">
               <a:rPr lang="nl-NL" smtClean="0"/>
-              <a:t>‹nr.›</a:t>
+              <a:t>‹#›</a:t>
             </a:fld>
             <a:endParaRPr lang="nl-NL"/>
           </a:p>
@@ -1125,7 +1123,7 @@
           <a:p>
             <a:fld id="{3D636C07-7E76-46D3-B86B-6AF7C60E533E}" type="datetimeFigureOut">
               <a:rPr lang="nl-NL" smtClean="0"/>
-              <a:t>8-11-2020</a:t>
+              <a:t>08-11-2020</a:t>
             </a:fld>
             <a:endParaRPr lang="nl-NL"/>
           </a:p>
@@ -1167,7 +1165,7 @@
           <a:p>
             <a:fld id="{A9096D49-DAE3-40DE-93E0-41688E0A5016}" type="slidenum">
               <a:rPr lang="nl-NL" smtClean="0"/>
-              <a:t>‹nr.›</a:t>
+              <a:t>‹#›</a:t>
             </a:fld>
             <a:endParaRPr lang="nl-NL"/>
           </a:p>
@@ -1267,7 +1265,7 @@
           <a:p>
             <a:fld id="{3D636C07-7E76-46D3-B86B-6AF7C60E533E}" type="datetimeFigureOut">
               <a:rPr lang="nl-NL" smtClean="0"/>
-              <a:t>8-11-2020</a:t>
+              <a:t>08-11-2020</a:t>
             </a:fld>
             <a:endParaRPr lang="nl-NL"/>
           </a:p>
@@ -1309,7 +1307,7 @@
           <a:p>
             <a:fld id="{A9096D49-DAE3-40DE-93E0-41688E0A5016}" type="slidenum">
               <a:rPr lang="nl-NL" smtClean="0"/>
-              <a:t>‹nr.›</a:t>
+              <a:t>‹#›</a:t>
             </a:fld>
             <a:endParaRPr lang="nl-NL"/>
           </a:p>
@@ -1514,7 +1512,7 @@
           <a:p>
             <a:fld id="{3D636C07-7E76-46D3-B86B-6AF7C60E533E}" type="datetimeFigureOut">
               <a:rPr lang="nl-NL" smtClean="0"/>
-              <a:t>8-11-2020</a:t>
+              <a:t>08-11-2020</a:t>
             </a:fld>
             <a:endParaRPr lang="nl-NL"/>
           </a:p>
@@ -1556,7 +1554,7 @@
           <a:p>
             <a:fld id="{A9096D49-DAE3-40DE-93E0-41688E0A5016}" type="slidenum">
               <a:rPr lang="nl-NL" smtClean="0"/>
-              <a:t>‹nr.›</a:t>
+              <a:t>‹#›</a:t>
             </a:fld>
             <a:endParaRPr lang="nl-NL"/>
           </a:p>
@@ -1913,7 +1911,7 @@
           <a:p>
             <a:fld id="{3D636C07-7E76-46D3-B86B-6AF7C60E533E}" type="datetimeFigureOut">
               <a:rPr lang="nl-NL" smtClean="0"/>
-              <a:t>8-11-2020</a:t>
+              <a:t>08-11-2020</a:t>
             </a:fld>
             <a:endParaRPr lang="nl-NL"/>
           </a:p>
@@ -1955,7 +1953,7 @@
           <a:p>
             <a:fld id="{A9096D49-DAE3-40DE-93E0-41688E0A5016}" type="slidenum">
               <a:rPr lang="nl-NL" smtClean="0"/>
-              <a:t>‹nr.›</a:t>
+              <a:t>‹#›</a:t>
             </a:fld>
             <a:endParaRPr lang="nl-NL"/>
           </a:p>
@@ -2351,7 +2349,7 @@
           <a:p>
             <a:fld id="{3D636C07-7E76-46D3-B86B-6AF7C60E533E}" type="datetimeFigureOut">
               <a:rPr lang="nl-NL" smtClean="0"/>
-              <a:t>8-11-2020</a:t>
+              <a:t>08-11-2020</a:t>
             </a:fld>
             <a:endParaRPr lang="nl-NL"/>
           </a:p>
@@ -2393,7 +2391,7 @@
           <a:p>
             <a:fld id="{A9096D49-DAE3-40DE-93E0-41688E0A5016}" type="slidenum">
               <a:rPr lang="nl-NL" smtClean="0"/>
-              <a:t>‹nr.›</a:t>
+              <a:t>‹#›</a:t>
             </a:fld>
             <a:endParaRPr lang="nl-NL"/>
           </a:p>
@@ -2446,7 +2444,7 @@
           <a:p>
             <a:fld id="{3D636C07-7E76-46D3-B86B-6AF7C60E533E}" type="datetimeFigureOut">
               <a:rPr lang="nl-NL" smtClean="0"/>
-              <a:t>8-11-2020</a:t>
+              <a:t>08-11-2020</a:t>
             </a:fld>
             <a:endParaRPr lang="nl-NL"/>
           </a:p>
@@ -2488,7 +2486,7 @@
           <a:p>
             <a:fld id="{A9096D49-DAE3-40DE-93E0-41688E0A5016}" type="slidenum">
               <a:rPr lang="nl-NL" smtClean="0"/>
-              <a:t>‹nr.›</a:t>
+              <a:t>‹#›</a:t>
             </a:fld>
             <a:endParaRPr lang="nl-NL"/>
           </a:p>
@@ -2559,7 +2557,7 @@
           <a:p>
             <a:fld id="{3D636C07-7E76-46D3-B86B-6AF7C60E533E}" type="datetimeFigureOut">
               <a:rPr lang="nl-NL" smtClean="0"/>
-              <a:t>8-11-2020</a:t>
+              <a:t>08-11-2020</a:t>
             </a:fld>
             <a:endParaRPr lang="nl-NL"/>
           </a:p>
@@ -2601,7 +2599,7 @@
           <a:p>
             <a:fld id="{A9096D49-DAE3-40DE-93E0-41688E0A5016}" type="slidenum">
               <a:rPr lang="nl-NL" smtClean="0"/>
-              <a:t>‹nr.›</a:t>
+              <a:t>‹#›</a:t>
             </a:fld>
             <a:endParaRPr lang="nl-NL"/>
           </a:p>
@@ -2827,7 +2825,7 @@
           <a:p>
             <a:fld id="{3D636C07-7E76-46D3-B86B-6AF7C60E533E}" type="datetimeFigureOut">
               <a:rPr lang="nl-NL" smtClean="0"/>
-              <a:t>8-11-2020</a:t>
+              <a:t>08-11-2020</a:t>
             </a:fld>
             <a:endParaRPr lang="nl-NL"/>
           </a:p>
@@ -2869,7 +2867,7 @@
           <a:p>
             <a:fld id="{A9096D49-DAE3-40DE-93E0-41688E0A5016}" type="slidenum">
               <a:rPr lang="nl-NL" smtClean="0"/>
-              <a:t>‹nr.›</a:t>
+              <a:t>‹#›</a:t>
             </a:fld>
             <a:endParaRPr lang="nl-NL"/>
           </a:p>
@@ -3028,7 +3026,7 @@
           <a:p>
             <a:fld id="{3D636C07-7E76-46D3-B86B-6AF7C60E533E}" type="datetimeFigureOut">
               <a:rPr lang="nl-NL" smtClean="0"/>
-              <a:t>8-11-2020</a:t>
+              <a:t>08-11-2020</a:t>
             </a:fld>
             <a:endParaRPr lang="nl-NL"/>
           </a:p>
@@ -3093,7 +3091,7 @@
           <a:p>
             <a:fld id="{A9096D49-DAE3-40DE-93E0-41688E0A5016}" type="slidenum">
               <a:rPr lang="nl-NL" smtClean="0"/>
-              <a:t>‹nr.›</a:t>
+              <a:t>‹#›</a:t>
             </a:fld>
             <a:endParaRPr lang="nl-NL"/>
           </a:p>
@@ -4117,7 +4115,7 @@
           <a:p>
             <a:fld id="{3D636C07-7E76-46D3-B86B-6AF7C60E533E}" type="datetimeFigureOut">
               <a:rPr lang="nl-NL" smtClean="0"/>
-              <a:t>8-11-2020</a:t>
+              <a:t>08-11-2020</a:t>
             </a:fld>
             <a:endParaRPr lang="nl-NL"/>
           </a:p>
@@ -4193,7 +4191,7 @@
           <a:p>
             <a:fld id="{A9096D49-DAE3-40DE-93E0-41688E0A5016}" type="slidenum">
               <a:rPr lang="nl-NL" smtClean="0"/>
-              <a:t>‹nr.›</a:t>
+              <a:t>‹#›</a:t>
             </a:fld>
             <a:endParaRPr lang="nl-NL"/>
           </a:p>
@@ -4580,201 +4578,78 @@
           <a:chExt cx="0" cy="0"/>
         </a:xfrm>
       </p:grpSpPr>
-      <mc:AlternateContent xmlns:mc="http://schemas.openxmlformats.org/markup-compatibility/2006" xmlns:a14="http://schemas.microsoft.com/office/drawing/2010/main">
-        <mc:Choice Requires="a14">
-          <p:sp>
-            <p:nvSpPr>
-              <p:cNvPr id="2" name="Tijdelijke aanduiding voor inhoud 1"/>
-              <p:cNvSpPr>
-                <a:spLocks noGrp="1"/>
-              </p:cNvSpPr>
-              <p:nvPr>
-                <p:ph idx="1"/>
-              </p:nvPr>
-            </p:nvSpPr>
-            <p:spPr/>
-            <p:txBody>
-              <a:bodyPr/>
-              <a:lstStyle/>
-              <a:p>
-                <a:r>
-                  <a:rPr lang="nl-BE" dirty="0"/>
-                  <a:t>Counting Constraint Satisfaction Problem</a:t>
-                </a:r>
-              </a:p>
-              <a:p>
-                <a:pPr lvl="1"/>
-                <a:r>
-                  <a:rPr lang="nl-BE" dirty="0"/>
-                  <a:t>Find the number of satisfying assignments</a:t>
-                </a:r>
-              </a:p>
-              <a:p>
-                <a:pPr lvl="2"/>
-                <a14:m>
-                  <m:oMath xmlns:m="http://schemas.openxmlformats.org/officeDocument/2006/math">
-                    <m:r>
-                      <a:rPr lang="nl-BE" b="0" i="1" smtClean="0">
-                        <a:latin typeface="Cambria Math" panose="02040503050406030204" pitchFamily="18" charset="0"/>
-                      </a:rPr>
-                      <m:t>𝑀𝐶</m:t>
-                    </m:r>
-                    <m:d>
-                      <m:dPr>
-                        <m:begChr m:val="⟨"/>
-                        <m:endChr m:val="⟩"/>
-                        <m:ctrlPr>
-                          <a:rPr lang="nl-BE" b="0" i="1" smtClean="0">
-                            <a:latin typeface="Cambria Math"/>
-                          </a:rPr>
-                        </m:ctrlPr>
-                      </m:dPr>
-                      <m:e>
-                        <m:r>
-                          <a:rPr lang="nl-BE" b="0" i="1" smtClean="0">
-                            <a:latin typeface="Cambria Math" panose="02040503050406030204" pitchFamily="18" charset="0"/>
-                          </a:rPr>
-                          <m:t>𝑉</m:t>
-                        </m:r>
-                        <m:r>
-                          <a:rPr lang="nl-BE" b="0" i="1" smtClean="0">
-                            <a:latin typeface="Cambria Math" panose="02040503050406030204" pitchFamily="18" charset="0"/>
-                          </a:rPr>
-                          <m:t>,</m:t>
-                        </m:r>
-                        <m:r>
-                          <a:rPr lang="nl-BE" b="0" i="1" smtClean="0">
-                            <a:latin typeface="Cambria Math" panose="02040503050406030204" pitchFamily="18" charset="0"/>
-                          </a:rPr>
-                          <m:t>𝐷</m:t>
-                        </m:r>
-                        <m:r>
-                          <a:rPr lang="nl-BE" b="0" i="1" smtClean="0">
-                            <a:latin typeface="Cambria Math" panose="02040503050406030204" pitchFamily="18" charset="0"/>
-                          </a:rPr>
-                          <m:t>,</m:t>
-                        </m:r>
-                        <m:r>
-                          <a:rPr lang="nl-BE" b="0" i="1" smtClean="0">
-                            <a:latin typeface="Cambria Math" panose="02040503050406030204" pitchFamily="18" charset="0"/>
-                          </a:rPr>
-                          <m:t>𝐶</m:t>
-                        </m:r>
-                      </m:e>
-                    </m:d>
-                  </m:oMath>
-                </a14:m>
-                <a:endParaRPr lang="nl-BE" dirty="0"/>
-              </a:p>
-              <a:p>
-                <a:r>
-                  <a:rPr lang="nl-BE" dirty="0"/>
-                  <a:t>Combinatorics problems can be expressed as #CSPs</a:t>
-                </a:r>
-              </a:p>
-              <a:p>
-                <a:pPr lvl="1"/>
-                <a:r>
-                  <a:rPr lang="nl-BE" dirty="0"/>
-                  <a:t>Set </a:t>
-                </a:r>
-                <a14:m>
-                  <m:oMath xmlns:m="http://schemas.openxmlformats.org/officeDocument/2006/math">
-                    <m:r>
-                      <a:rPr lang="nl-BE" b="0" i="1" smtClean="0">
-                        <a:latin typeface="Cambria Math" panose="02040503050406030204" pitchFamily="18" charset="0"/>
-                      </a:rPr>
-                      <m:t>𝑋</m:t>
-                    </m:r>
-                  </m:oMath>
-                </a14:m>
-                <a:r>
-                  <a:rPr lang="nl-BE" dirty="0"/>
-                  <a:t> </a:t>
-                </a:r>
-                <a:r>
-                  <a:rPr lang="nl-BE" dirty="0">
-                    <a:sym typeface="Wingdings" pitchFamily="2" charset="2"/>
-                  </a:rPr>
-                  <a:t> set of variables</a:t>
-                </a:r>
-              </a:p>
-              <a:p>
-                <a:pPr lvl="1"/>
-                <a:r>
-                  <a:rPr lang="nl-BE" dirty="0">
-                    <a:sym typeface="Wingdings" pitchFamily="2" charset="2"/>
-                  </a:rPr>
-                  <a:t>Set </a:t>
-                </a:r>
-                <a14:m>
-                  <m:oMath xmlns:m="http://schemas.openxmlformats.org/officeDocument/2006/math">
-                    <m:r>
-                      <a:rPr lang="nl-BE" b="0" i="1" smtClean="0">
-                        <a:latin typeface="Cambria Math" panose="02040503050406030204" pitchFamily="18" charset="0"/>
-                        <a:sym typeface="Wingdings" pitchFamily="2" charset="2"/>
-                      </a:rPr>
-                      <m:t>𝑌</m:t>
-                    </m:r>
-                  </m:oMath>
-                </a14:m>
-                <a:r>
-                  <a:rPr lang="nl-BE" dirty="0"/>
-                  <a:t> </a:t>
-                </a:r>
-                <a:r>
-                  <a:rPr lang="nl-BE" dirty="0">
-                    <a:sym typeface="Wingdings" pitchFamily="2" charset="2"/>
-                  </a:rPr>
-                  <a:t> domain</a:t>
-                </a:r>
-              </a:p>
-              <a:p>
-                <a:r>
-                  <a:rPr lang="nl-BE" dirty="0">
-                    <a:sym typeface="Wingdings" pitchFamily="2" charset="2"/>
-                  </a:rPr>
-                  <a:t>Generalization of #SAT: counting the number of satsifying intepretations for a Boolean formula </a:t>
-                </a:r>
-                <a:endParaRPr lang="nl-BE" dirty="0"/>
-              </a:p>
-            </p:txBody>
-          </p:sp>
-        </mc:Choice>
-        <mc:Fallback xmlns="">
-          <p:sp>
-            <p:nvSpPr>
-              <p:cNvPr id="2" name="Tijdelijke aanduiding voor inhoud 1"/>
-              <p:cNvSpPr>
-                <a:spLocks noGrp="1" noRot="1" noChangeAspect="1" noMove="1" noResize="1" noEditPoints="1" noAdjustHandles="1" noChangeArrowheads="1" noChangeShapeType="1" noTextEdit="1"/>
-              </p:cNvSpPr>
-              <p:nvPr>
-                <p:ph idx="1"/>
-              </p:nvPr>
-            </p:nvSpPr>
-            <p:spPr>
-              <a:blipFill>
-                <a:blip r:embed="rId2"/>
-                <a:stretch>
-                  <a:fillRect t="-1401" r="-1389"/>
-                </a:stretch>
-              </a:blipFill>
-            </p:spPr>
-            <p:txBody>
-              <a:bodyPr/>
-              <a:lstStyle/>
-              <a:p>
-                <a:r>
-                  <a:rPr lang="en-BE">
-                    <a:noFill/>
-                  </a:rPr>
-                  <a:t> </a:t>
-                </a:r>
-              </a:p>
-            </p:txBody>
-          </p:sp>
-        </mc:Fallback>
-      </mc:AlternateContent>
+      <p:sp>
+        <p:nvSpPr>
+          <p:cNvPr id="2" name="Tijdelijke aanduiding voor inhoud 1"/>
+          <p:cNvSpPr>
+            <a:spLocks noGrp="1"/>
+          </p:cNvSpPr>
+          <p:nvPr>
+            <p:ph idx="1"/>
+          </p:nvPr>
+        </p:nvSpPr>
+        <p:spPr/>
+        <p:txBody>
+          <a:bodyPr/>
+          <a:lstStyle/>
+          <a:p>
+            <a:r>
+              <a:rPr lang="nl-BE" dirty="0"/>
+              <a:t>Elements</a:t>
+            </a:r>
+          </a:p>
+          <a:p>
+            <a:pPr lvl="1"/>
+            <a:r>
+              <a:rPr lang="nl-BE" dirty="0"/>
+              <a:t>Atomic objects</a:t>
+            </a:r>
+          </a:p>
+          <a:p>
+            <a:r>
+              <a:rPr lang="nl-BE" dirty="0"/>
+              <a:t>Domains</a:t>
+            </a:r>
+          </a:p>
+          <a:p>
+            <a:pPr lvl="1"/>
+            <a:r>
+              <a:rPr lang="nl-BE" dirty="0"/>
+              <a:t>Sets of elements</a:t>
+            </a:r>
+          </a:p>
+          <a:p>
+            <a:r>
+              <a:rPr lang="nl-BE" dirty="0" err="1"/>
+              <a:t>Structures</a:t>
+            </a:r>
+            <a:endParaRPr lang="nl-BE" dirty="0"/>
+          </a:p>
+          <a:p>
+            <a:pPr lvl="1"/>
+            <a:r>
+              <a:rPr lang="nl-BE" dirty="0" err="1"/>
+              <a:t>Twelvefold</a:t>
+            </a:r>
+            <a:r>
+              <a:rPr lang="nl-BE" dirty="0"/>
+              <a:t> way </a:t>
+            </a:r>
+            <a:r>
+              <a:rPr lang="nl-BE" dirty="0" err="1"/>
+              <a:t>problem</a:t>
+            </a:r>
+            <a:endParaRPr lang="nl-BE" dirty="0"/>
+          </a:p>
+          <a:p>
+            <a:pPr lvl="1"/>
+            <a:r>
+              <a:rPr lang="nl-BE" dirty="0"/>
+              <a:t>(D, F)</a:t>
+            </a:r>
+          </a:p>
+        </p:txBody>
+      </p:sp>
       <p:sp>
         <p:nvSpPr>
           <p:cNvPr id="3" name="Titel 2"/>
@@ -4791,16 +4666,17 @@
           <a:lstStyle/>
           <a:p>
             <a:r>
-              <a:rPr lang="nl-BE" dirty="0"/>
-              <a:t>#CSP</a:t>
-            </a:r>
+              <a:rPr lang="nl-BE" dirty="0" err="1"/>
+              <a:t>CoLa</a:t>
+            </a:r>
+            <a:endParaRPr lang="nl-BE" dirty="0"/>
           </a:p>
         </p:txBody>
       </p:sp>
     </p:spTree>
     <p:extLst>
       <p:ext uri="{BB962C8B-B14F-4D97-AF65-F5344CB8AC3E}">
-        <p14:creationId xmlns:p14="http://schemas.microsoft.com/office/powerpoint/2010/main" val="281160088"/>
+        <p14:creationId xmlns:p14="http://schemas.microsoft.com/office/powerpoint/2010/main" val="349216217"/>
       </p:ext>
     </p:extLst>
   </p:cSld>
@@ -4844,230 +4720,6 @@
           <a:p>
             <a:r>
               <a:rPr lang="nl-BE" dirty="0"/>
-              <a:t>#CSPs generalize #SAT</a:t>
-            </a:r>
-          </a:p>
-          <a:p>
-            <a:r>
-              <a:rPr lang="nl-BE" dirty="0"/>
-              <a:t>#SAT is #P-complete</a:t>
-            </a:r>
-          </a:p>
-          <a:p>
-            <a:pPr lvl="1"/>
-            <a:r>
-              <a:rPr lang="nl-BE" dirty="0"/>
-              <a:t>#P: class of counting problems</a:t>
-            </a:r>
-            <a:endParaRPr lang="nl-BE" dirty="0">
-              <a:sym typeface="Wingdings" pitchFamily="2" charset="2"/>
-            </a:endParaRPr>
-          </a:p>
-          <a:p>
-            <a:r>
-              <a:rPr lang="nl-BE" dirty="0">
-                <a:sym typeface="Wingdings" pitchFamily="2" charset="2"/>
-              </a:rPr>
-              <a:t>All counting problems can be reduced to #SATs</a:t>
-            </a:r>
-            <a:endParaRPr lang="nl-BE" dirty="0"/>
-          </a:p>
-        </p:txBody>
-      </p:sp>
-      <p:sp>
-        <p:nvSpPr>
-          <p:cNvPr id="3" name="Titel 2"/>
-          <p:cNvSpPr>
-            <a:spLocks noGrp="1"/>
-          </p:cNvSpPr>
-          <p:nvPr>
-            <p:ph type="title"/>
-          </p:nvPr>
-        </p:nvSpPr>
-        <p:spPr/>
-        <p:txBody>
-          <a:bodyPr/>
-          <a:lstStyle/>
-          <a:p>
-            <a:r>
-              <a:rPr lang="nl-BE" dirty="0"/>
-              <a:t>#SAT and #CSPs</a:t>
-            </a:r>
-          </a:p>
-        </p:txBody>
-      </p:sp>
-    </p:spTree>
-    <p:extLst>
-      <p:ext uri="{BB962C8B-B14F-4D97-AF65-F5344CB8AC3E}">
-        <p14:creationId xmlns:p14="http://schemas.microsoft.com/office/powerpoint/2010/main" val="842178977"/>
-      </p:ext>
-    </p:extLst>
-  </p:cSld>
-  <p:clrMapOvr>
-    <a:masterClrMapping/>
-  </p:clrMapOvr>
-</p:sld>
-</file>
-
-<file path=ppt/slides/slide12.xml><?xml version="1.0" encoding="utf-8"?>
-<p:sld xmlns:a="http://schemas.openxmlformats.org/drawingml/2006/main" xmlns:r="http://schemas.openxmlformats.org/officeDocument/2006/relationships" xmlns:p="http://schemas.openxmlformats.org/presentationml/2006/main">
-  <p:cSld>
-    <p:spTree>
-      <p:nvGrpSpPr>
-        <p:cNvPr id="1" name=""/>
-        <p:cNvGrpSpPr/>
-        <p:nvPr/>
-      </p:nvGrpSpPr>
-      <p:grpSpPr>
-        <a:xfrm>
-          <a:off x="0" y="0"/>
-          <a:ext cx="0" cy="0"/>
-          <a:chOff x="0" y="0"/>
-          <a:chExt cx="0" cy="0"/>
-        </a:xfrm>
-      </p:grpSpPr>
-      <p:sp>
-        <p:nvSpPr>
-          <p:cNvPr id="2" name="Tijdelijke aanduiding voor inhoud 1"/>
-          <p:cNvSpPr>
-            <a:spLocks noGrp="1"/>
-          </p:cNvSpPr>
-          <p:nvPr>
-            <p:ph idx="1"/>
-          </p:nvPr>
-        </p:nvSpPr>
-        <p:spPr/>
-        <p:txBody>
-          <a:bodyPr/>
-          <a:lstStyle/>
-          <a:p>
-            <a:r>
-              <a:rPr lang="nl-BE" dirty="0"/>
-              <a:t>Elements</a:t>
-            </a:r>
-          </a:p>
-          <a:p>
-            <a:pPr lvl="1"/>
-            <a:r>
-              <a:rPr lang="nl-BE" dirty="0"/>
-              <a:t>Atomic objects</a:t>
-            </a:r>
-          </a:p>
-          <a:p>
-            <a:r>
-              <a:rPr lang="nl-BE" dirty="0"/>
-              <a:t>Domains</a:t>
-            </a:r>
-          </a:p>
-          <a:p>
-            <a:pPr lvl="1"/>
-            <a:r>
-              <a:rPr lang="nl-BE" dirty="0"/>
-              <a:t>Sets of elements</a:t>
-            </a:r>
-          </a:p>
-          <a:p>
-            <a:r>
-              <a:rPr lang="nl-BE" dirty="0" err="1"/>
-              <a:t>Structures</a:t>
-            </a:r>
-            <a:endParaRPr lang="nl-BE" dirty="0"/>
-          </a:p>
-          <a:p>
-            <a:pPr lvl="1"/>
-            <a:r>
-              <a:rPr lang="nl-BE" dirty="0" err="1"/>
-              <a:t>Twelvefold</a:t>
-            </a:r>
-            <a:r>
-              <a:rPr lang="nl-BE" dirty="0"/>
-              <a:t> way </a:t>
-            </a:r>
-            <a:r>
-              <a:rPr lang="nl-BE" dirty="0" err="1"/>
-              <a:t>problem</a:t>
-            </a:r>
-            <a:endParaRPr lang="nl-BE" dirty="0"/>
-          </a:p>
-          <a:p>
-            <a:pPr lvl="1"/>
-            <a:r>
-              <a:rPr lang="nl-BE" dirty="0"/>
-              <a:t>(D, F)</a:t>
-            </a:r>
-          </a:p>
-        </p:txBody>
-      </p:sp>
-      <p:sp>
-        <p:nvSpPr>
-          <p:cNvPr id="3" name="Titel 2"/>
-          <p:cNvSpPr>
-            <a:spLocks noGrp="1"/>
-          </p:cNvSpPr>
-          <p:nvPr>
-            <p:ph type="title"/>
-          </p:nvPr>
-        </p:nvSpPr>
-        <p:spPr/>
-        <p:txBody>
-          <a:bodyPr/>
-          <a:lstStyle/>
-          <a:p>
-            <a:r>
-              <a:rPr lang="nl-BE" dirty="0" err="1"/>
-              <a:t>CoLa</a:t>
-            </a:r>
-            <a:endParaRPr lang="nl-BE" dirty="0"/>
-          </a:p>
-        </p:txBody>
-      </p:sp>
-    </p:spTree>
-    <p:extLst>
-      <p:ext uri="{BB962C8B-B14F-4D97-AF65-F5344CB8AC3E}">
-        <p14:creationId xmlns:p14="http://schemas.microsoft.com/office/powerpoint/2010/main" val="349216217"/>
-      </p:ext>
-    </p:extLst>
-  </p:cSld>
-  <p:clrMapOvr>
-    <a:masterClrMapping/>
-  </p:clrMapOvr>
-</p:sld>
-</file>
-
-<file path=ppt/slides/slide13.xml><?xml version="1.0" encoding="utf-8"?>
-<p:sld xmlns:a="http://schemas.openxmlformats.org/drawingml/2006/main" xmlns:r="http://schemas.openxmlformats.org/officeDocument/2006/relationships" xmlns:p="http://schemas.openxmlformats.org/presentationml/2006/main">
-  <p:cSld>
-    <p:spTree>
-      <p:nvGrpSpPr>
-        <p:cNvPr id="1" name=""/>
-        <p:cNvGrpSpPr/>
-        <p:nvPr/>
-      </p:nvGrpSpPr>
-      <p:grpSpPr>
-        <a:xfrm>
-          <a:off x="0" y="0"/>
-          <a:ext cx="0" cy="0"/>
-          <a:chOff x="0" y="0"/>
-          <a:chExt cx="0" cy="0"/>
-        </a:xfrm>
-      </p:grpSpPr>
-      <p:sp>
-        <p:nvSpPr>
-          <p:cNvPr id="2" name="Tijdelijke aanduiding voor inhoud 1"/>
-          <p:cNvSpPr>
-            <a:spLocks noGrp="1"/>
-          </p:cNvSpPr>
-          <p:nvPr>
-            <p:ph idx="1"/>
-          </p:nvPr>
-        </p:nvSpPr>
-        <p:spPr/>
-        <p:txBody>
-          <a:bodyPr/>
-          <a:lstStyle/>
-          <a:p>
-            <a:r>
-              <a:rPr lang="nl-BE" dirty="0"/>
               <a:t>Domain </a:t>
             </a:r>
             <a:r>
@@ -5201,7 +4853,7 @@
 </p:sld>
 </file>
 
-<file path=ppt/slides/slide14.xml><?xml version="1.0" encoding="utf-8"?>
+<file path=ppt/slides/slide12.xml><?xml version="1.0" encoding="utf-8"?>
 <p:sld xmlns:a="http://schemas.openxmlformats.org/drawingml/2006/main" xmlns:r="http://schemas.openxmlformats.org/officeDocument/2006/relationships" xmlns:p="http://schemas.openxmlformats.org/presentationml/2006/main">
   <p:cSld>
     <p:spTree>
@@ -5259,7 +4911,7 @@
                       <m:sSubPr>
                         <m:ctrlPr>
                           <a:rPr lang="x-none" i="1">
-                            <a:latin typeface="Cambria Math"/>
+                            <a:latin typeface="Cambria Math" panose="02040503050406030204" pitchFamily="18" charset="0"/>
                           </a:rPr>
                         </m:ctrlPr>
                       </m:sSubPr>
@@ -5290,7 +4942,7 @@
                       <m:sSubPr>
                         <m:ctrlPr>
                           <a:rPr lang="x-none" i="1">
-                            <a:latin typeface="Cambria Math"/>
+                            <a:latin typeface="Cambria Math" panose="02040503050406030204" pitchFamily="18" charset="0"/>
                           </a:rPr>
                         </m:ctrlPr>
                       </m:sSubPr>
@@ -5330,7 +4982,7 @@
                       <m:sSubPr>
                         <m:ctrlPr>
                           <a:rPr lang="x-none" i="1">
-                            <a:latin typeface="Cambria Math"/>
+                            <a:latin typeface="Cambria Math" panose="02040503050406030204" pitchFamily="18" charset="0"/>
                           </a:rPr>
                         </m:ctrlPr>
                       </m:sSubPr>
@@ -5361,7 +5013,7 @@
                       <m:sSubPr>
                         <m:ctrlPr>
                           <a:rPr lang="x-none" i="1">
-                            <a:latin typeface="Cambria Math"/>
+                            <a:latin typeface="Cambria Math" panose="02040503050406030204" pitchFamily="18" charset="0"/>
                           </a:rPr>
                         </m:ctrlPr>
                       </m:sSubPr>
@@ -5392,7 +5044,7 @@
                       <m:sSubPr>
                         <m:ctrlPr>
                           <a:rPr lang="x-none" i="1">
-                            <a:latin typeface="Cambria Math"/>
+                            <a:latin typeface="Cambria Math" panose="02040503050406030204" pitchFamily="18" charset="0"/>
                           </a:rPr>
                         </m:ctrlPr>
                       </m:sSubPr>
@@ -5423,7 +5075,7 @@
                       <m:sSubPr>
                         <m:ctrlPr>
                           <a:rPr lang="x-none" i="1">
-                            <a:latin typeface="Cambria Math"/>
+                            <a:latin typeface="Cambria Math" panose="02040503050406030204" pitchFamily="18" charset="0"/>
                           </a:rPr>
                         </m:ctrlPr>
                       </m:sSubPr>
@@ -5477,7 +5129,7 @@
                       <m:sSubPr>
                         <m:ctrlPr>
                           <a:rPr lang="x-none" i="1">
-                            <a:latin typeface="Cambria Math"/>
+                            <a:latin typeface="Cambria Math" panose="02040503050406030204" pitchFamily="18" charset="0"/>
                           </a:rPr>
                         </m:ctrlPr>
                       </m:sSubPr>
@@ -5508,7 +5160,7 @@
                       <m:sSubPr>
                         <m:ctrlPr>
                           <a:rPr lang="x-none" i="1">
-                            <a:latin typeface="Cambria Math"/>
+                            <a:latin typeface="Cambria Math" panose="02040503050406030204" pitchFamily="18" charset="0"/>
                           </a:rPr>
                         </m:ctrlPr>
                       </m:sSubPr>
@@ -5545,7 +5197,7 @@
                       <m:sSubPr>
                         <m:ctrlPr>
                           <a:rPr lang="x-none" i="1">
-                            <a:latin typeface="Cambria Math"/>
+                            <a:latin typeface="Cambria Math" panose="02040503050406030204" pitchFamily="18" charset="0"/>
                           </a:rPr>
                         </m:ctrlPr>
                       </m:sSubPr>
@@ -5576,7 +5228,7 @@
                       <m:sSubPr>
                         <m:ctrlPr>
                           <a:rPr lang="x-none" i="1">
-                            <a:latin typeface="Cambria Math"/>
+                            <a:latin typeface="Cambria Math" panose="02040503050406030204" pitchFamily="18" charset="0"/>
                           </a:rPr>
                         </m:ctrlPr>
                       </m:sSubPr>
@@ -5700,7 +5352,7 @@
 </p:sld>
 </file>
 
-<file path=ppt/slides/slide15.xml><?xml version="1.0" encoding="utf-8"?>
+<file path=ppt/slides/slide13.xml><?xml version="1.0" encoding="utf-8"?>
 <p:sld xmlns:a="http://schemas.openxmlformats.org/drawingml/2006/main" xmlns:r="http://schemas.openxmlformats.org/officeDocument/2006/relationships" xmlns:p="http://schemas.openxmlformats.org/presentationml/2006/main">
   <p:cSld>
     <p:spTree>
@@ -5755,7 +5407,7 @@
                       <m:sSubPr>
                         <m:ctrlPr>
                           <a:rPr lang="x-none" i="1">
-                            <a:latin typeface="Cambria Math"/>
+                            <a:latin typeface="Cambria Math" panose="02040503050406030204" pitchFamily="18" charset="0"/>
                           </a:rPr>
                         </m:ctrlPr>
                       </m:sSubPr>
@@ -5786,7 +5438,7 @@
                       <m:sSubPr>
                         <m:ctrlPr>
                           <a:rPr lang="x-none" i="1">
-                            <a:latin typeface="Cambria Math"/>
+                            <a:latin typeface="Cambria Math" panose="02040503050406030204" pitchFamily="18" charset="0"/>
                           </a:rPr>
                         </m:ctrlPr>
                       </m:sSubPr>
@@ -5817,7 +5469,7 @@
                       <m:sSubPr>
                         <m:ctrlPr>
                           <a:rPr lang="x-none" i="1">
-                            <a:latin typeface="Cambria Math"/>
+                            <a:latin typeface="Cambria Math" panose="02040503050406030204" pitchFamily="18" charset="0"/>
                           </a:rPr>
                         </m:ctrlPr>
                       </m:sSubPr>
@@ -5848,7 +5500,7 @@
                       <m:sSubPr>
                         <m:ctrlPr>
                           <a:rPr lang="x-none" i="1">
-                            <a:latin typeface="Cambria Math"/>
+                            <a:latin typeface="Cambria Math" panose="02040503050406030204" pitchFamily="18" charset="0"/>
                           </a:rPr>
                         </m:ctrlPr>
                       </m:sSubPr>
@@ -5879,7 +5531,7 @@
                       <m:sSubPr>
                         <m:ctrlPr>
                           <a:rPr lang="x-none" i="1">
-                            <a:latin typeface="Cambria Math"/>
+                            <a:latin typeface="Cambria Math" panose="02040503050406030204" pitchFamily="18" charset="0"/>
                           </a:rPr>
                         </m:ctrlPr>
                       </m:sSubPr>
@@ -6040,7 +5692,7 @@
 </p:sld>
 </file>
 
-<file path=ppt/slides/slide16.xml><?xml version="1.0" encoding="utf-8"?>
+<file path=ppt/slides/slide14.xml><?xml version="1.0" encoding="utf-8"?>
 <p:sld xmlns:a="http://schemas.openxmlformats.org/drawingml/2006/main" xmlns:r="http://schemas.openxmlformats.org/officeDocument/2006/relationships" xmlns:p="http://schemas.openxmlformats.org/presentationml/2006/main">
   <p:cSld>
     <p:spTree>
@@ -6099,7 +5751,7 @@
                       <m:dPr>
                         <m:ctrlPr>
                           <a:rPr lang="nl-BE" b="0" i="1" smtClean="0">
-                            <a:latin typeface="Cambria Math"/>
+                            <a:latin typeface="Cambria Math" panose="02040503050406030204" pitchFamily="18" charset="0"/>
                           </a:rPr>
                         </m:ctrlPr>
                       </m:dPr>
@@ -6108,7 +5760,7 @@
                           <m:sSubPr>
                             <m:ctrlPr>
                               <a:rPr lang="nl-BE" b="0" i="1" smtClean="0">
-                                <a:latin typeface="Cambria Math"/>
+                                <a:latin typeface="Cambria Math" panose="02040503050406030204" pitchFamily="18" charset="0"/>
                               </a:rPr>
                             </m:ctrlPr>
                           </m:sSubPr>
@@ -6140,7 +5792,7 @@
                           <m:sSubPr>
                             <m:ctrlPr>
                               <a:rPr lang="nl-BE" b="0" i="1" smtClean="0">
-                                <a:latin typeface="Cambria Math"/>
+                                <a:latin typeface="Cambria Math" panose="02040503050406030204" pitchFamily="18" charset="0"/>
                                 <a:ea typeface="Cambria Math" panose="02040503050406030204" pitchFamily="18" charset="0"/>
                               </a:rPr>
                             </m:ctrlPr>
@@ -6189,7 +5841,7 @@
                           <m:sSubPr>
                             <m:ctrlPr>
                               <a:rPr lang="nl-BE" b="0" i="1" smtClean="0">
-                                <a:latin typeface="Cambria Math"/>
+                                <a:latin typeface="Cambria Math" panose="02040503050406030204" pitchFamily="18" charset="0"/>
                                 <a:ea typeface="Cambria Math" panose="02040503050406030204" pitchFamily="18" charset="0"/>
                               </a:rPr>
                             </m:ctrlPr>
@@ -6224,7 +5876,7 @@
                           <m:sSubPr>
                             <m:ctrlPr>
                               <a:rPr lang="nl-BE" b="0" i="1" smtClean="0">
-                                <a:latin typeface="Cambria Math"/>
+                                <a:latin typeface="Cambria Math" panose="02040503050406030204" pitchFamily="18" charset="0"/>
                                 <a:ea typeface="Cambria Math" panose="02040503050406030204" pitchFamily="18" charset="0"/>
                               </a:rPr>
                             </m:ctrlPr>
@@ -6268,7 +5920,7 @@
                       <m:dPr>
                         <m:ctrlPr>
                           <a:rPr lang="nl-BE" b="0" i="1" smtClean="0">
-                            <a:latin typeface="Cambria Math"/>
+                            <a:latin typeface="Cambria Math" panose="02040503050406030204" pitchFamily="18" charset="0"/>
                             <a:ea typeface="Cambria Math" panose="02040503050406030204" pitchFamily="18" charset="0"/>
                           </a:rPr>
                         </m:ctrlPr>
@@ -6278,7 +5930,7 @@
                           <m:sSubPr>
                             <m:ctrlPr>
                               <a:rPr lang="nl-BE" b="0" i="1" smtClean="0">
-                                <a:latin typeface="Cambria Math"/>
+                                <a:latin typeface="Cambria Math" panose="02040503050406030204" pitchFamily="18" charset="0"/>
                                 <a:ea typeface="Cambria Math" panose="02040503050406030204" pitchFamily="18" charset="0"/>
                               </a:rPr>
                             </m:ctrlPr>
@@ -6327,7 +5979,7 @@
                           <m:sSubPr>
                             <m:ctrlPr>
                               <a:rPr lang="nl-BE" b="0" i="1" smtClean="0">
-                                <a:latin typeface="Cambria Math"/>
+                                <a:latin typeface="Cambria Math" panose="02040503050406030204" pitchFamily="18" charset="0"/>
                                 <a:ea typeface="Cambria Math" panose="02040503050406030204" pitchFamily="18" charset="0"/>
                               </a:rPr>
                             </m:ctrlPr>
@@ -6371,7 +6023,7 @@
                       <m:dPr>
                         <m:ctrlPr>
                           <a:rPr lang="nl-BE" b="0" i="1" smtClean="0">
-                            <a:latin typeface="Cambria Math"/>
+                            <a:latin typeface="Cambria Math" panose="02040503050406030204" pitchFamily="18" charset="0"/>
                             <a:ea typeface="Cambria Math" panose="02040503050406030204" pitchFamily="18" charset="0"/>
                           </a:rPr>
                         </m:ctrlPr>
@@ -6381,7 +6033,7 @@
                           <m:sSubPr>
                             <m:ctrlPr>
                               <a:rPr lang="nl-BE" b="0" i="1" smtClean="0">
-                                <a:latin typeface="Cambria Math"/>
+                                <a:latin typeface="Cambria Math" panose="02040503050406030204" pitchFamily="18" charset="0"/>
                                 <a:ea typeface="Cambria Math" panose="02040503050406030204" pitchFamily="18" charset="0"/>
                               </a:rPr>
                             </m:ctrlPr>
@@ -6430,7 +6082,7 @@
                           <m:sSubPr>
                             <m:ctrlPr>
                               <a:rPr lang="nl-BE" b="0" i="1" smtClean="0">
-                                <a:latin typeface="Cambria Math"/>
+                                <a:latin typeface="Cambria Math" panose="02040503050406030204" pitchFamily="18" charset="0"/>
                                 <a:ea typeface="Cambria Math" panose="02040503050406030204" pitchFamily="18" charset="0"/>
                               </a:rPr>
                             </m:ctrlPr>
@@ -6467,7 +6119,7 @@
                       <m:sSubPr>
                         <m:ctrlPr>
                           <a:rPr lang="nl-BE" b="0" i="1" smtClean="0">
-                            <a:latin typeface="Cambria Math"/>
+                            <a:latin typeface="Cambria Math" panose="02040503050406030204" pitchFamily="18" charset="0"/>
                             <a:ea typeface="Cambria Math" panose="02040503050406030204" pitchFamily="18" charset="0"/>
                           </a:rPr>
                         </m:ctrlPr>
@@ -6502,7 +6154,7 @@
                       <m:sSubPr>
                         <m:ctrlPr>
                           <a:rPr lang="nl-BE" i="1" smtClean="0">
-                            <a:latin typeface="Cambria Math"/>
+                            <a:latin typeface="Cambria Math" panose="02040503050406030204" pitchFamily="18" charset="0"/>
                             <a:ea typeface="Cambria Math" panose="02040503050406030204" pitchFamily="18" charset="0"/>
                           </a:rPr>
                         </m:ctrlPr>
@@ -6655,7 +6307,7 @@
 </p:sld>
 </file>
 
-<file path=ppt/slides/slide17.xml><?xml version="1.0" encoding="utf-8"?>
+<file path=ppt/slides/slide15.xml><?xml version="1.0" encoding="utf-8"?>
 <p:sld xmlns:a="http://schemas.openxmlformats.org/drawingml/2006/main" xmlns:r="http://schemas.openxmlformats.org/officeDocument/2006/relationships" xmlns:p="http://schemas.openxmlformats.org/presentationml/2006/main">
   <p:cSld>
     <p:spTree>
@@ -6721,7 +6373,7 @@
                         <m:endChr m:val="}"/>
                         <m:ctrlPr>
                           <a:rPr lang="nl-BE" b="0" i="1" smtClean="0">
-                            <a:latin typeface="Cambria Math"/>
+                            <a:latin typeface="Cambria Math" panose="02040503050406030204" pitchFamily="18" charset="0"/>
                           </a:rPr>
                         </m:ctrlPr>
                       </m:dPr>
@@ -6730,7 +6382,7 @@
                           <m:sSubPr>
                             <m:ctrlPr>
                               <a:rPr lang="nl-BE" b="0" i="1" smtClean="0">
-                                <a:latin typeface="Cambria Math"/>
+                                <a:latin typeface="Cambria Math" panose="02040503050406030204" pitchFamily="18" charset="0"/>
                               </a:rPr>
                             </m:ctrlPr>
                           </m:sSubPr>
@@ -6762,7 +6414,7 @@
                           <m:sSubPr>
                             <m:ctrlPr>
                               <a:rPr lang="nl-BE" b="0" i="1" smtClean="0">
-                                <a:latin typeface="Cambria Math"/>
+                                <a:latin typeface="Cambria Math" panose="02040503050406030204" pitchFamily="18" charset="0"/>
                                 <a:ea typeface="Cambria Math" panose="02040503050406030204" pitchFamily="18" charset="0"/>
                               </a:rPr>
                             </m:ctrlPr>
@@ -6806,7 +6458,7 @@
                         <m:endChr m:val="}"/>
                         <m:ctrlPr>
                           <a:rPr lang="nl-BE" b="0" i="1" smtClean="0">
-                            <a:latin typeface="Cambria Math"/>
+                            <a:latin typeface="Cambria Math" panose="02040503050406030204" pitchFamily="18" charset="0"/>
                           </a:rPr>
                         </m:ctrlPr>
                       </m:dPr>
@@ -6815,7 +6467,7 @@
                           <m:sSubPr>
                             <m:ctrlPr>
                               <a:rPr lang="nl-BE" i="1" smtClean="0">
-                                <a:latin typeface="Cambria Math"/>
+                                <a:latin typeface="Cambria Math" panose="02040503050406030204" pitchFamily="18" charset="0"/>
                               </a:rPr>
                             </m:ctrlPr>
                           </m:sSubPr>
@@ -6854,7 +6506,7 @@
                       <m:sSubPr>
                         <m:ctrlPr>
                           <a:rPr lang="nl-BE" b="0" i="1" smtClean="0">
-                            <a:latin typeface="Cambria Math"/>
+                            <a:latin typeface="Cambria Math" panose="02040503050406030204" pitchFamily="18" charset="0"/>
                           </a:rPr>
                         </m:ctrlPr>
                       </m:sSubPr>
@@ -6926,7 +6578,7 @@
                         <m:endChr m:val="}"/>
                         <m:ctrlPr>
                           <a:rPr lang="nl-BE" i="1">
-                            <a:latin typeface="Cambria Math"/>
+                            <a:latin typeface="Cambria Math" panose="02040503050406030204" pitchFamily="18" charset="0"/>
                           </a:rPr>
                         </m:ctrlPr>
                       </m:dPr>
@@ -6935,7 +6587,7 @@
                           <m:sSubPr>
                             <m:ctrlPr>
                               <a:rPr lang="nl-BE" i="1">
-                                <a:latin typeface="Cambria Math"/>
+                                <a:latin typeface="Cambria Math" panose="02040503050406030204" pitchFamily="18" charset="0"/>
                               </a:rPr>
                             </m:ctrlPr>
                           </m:sSubPr>
@@ -6982,7 +6634,7 @@
                         <m:endChr m:val="}"/>
                         <m:ctrlPr>
                           <a:rPr lang="nl-BE" i="1">
-                            <a:latin typeface="Cambria Math"/>
+                            <a:latin typeface="Cambria Math" panose="02040503050406030204" pitchFamily="18" charset="0"/>
                           </a:rPr>
                         </m:ctrlPr>
                       </m:dPr>
@@ -6991,7 +6643,7 @@
                           <m:sSubPr>
                             <m:ctrlPr>
                               <a:rPr lang="nl-BE" i="1">
-                                <a:latin typeface="Cambria Math"/>
+                                <a:latin typeface="Cambria Math" panose="02040503050406030204" pitchFamily="18" charset="0"/>
                               </a:rPr>
                             </m:ctrlPr>
                           </m:sSubPr>
@@ -7146,7 +6798,7 @@
 </p:sld>
 </file>
 
-<file path=ppt/slides/slide18.xml><?xml version="1.0" encoding="utf-8"?>
+<file path=ppt/slides/slide16.xml><?xml version="1.0" encoding="utf-8"?>
 <p:sld xmlns:a="http://schemas.openxmlformats.org/drawingml/2006/main" xmlns:r="http://schemas.openxmlformats.org/officeDocument/2006/relationships" xmlns:p="http://schemas.openxmlformats.org/presentationml/2006/main">
   <p:cSld>
     <p:spTree>
@@ -7168,7 +6820,7 @@
           <p:cNvPr id="2" name="Content Placeholder 1">
             <a:extLst>
               <a:ext uri="{FF2B5EF4-FFF2-40B4-BE49-F238E27FC236}">
-                <a16:creationId xmlns="" xmlns:a16="http://schemas.microsoft.com/office/drawing/2014/main" id="{40AC8F06-1FD3-6E47-8949-AA6CB8C87572}"/>
+                <a16:creationId xmlns:a16="http://schemas.microsoft.com/office/drawing/2014/main" id="{40AC8F06-1FD3-6E47-8949-AA6CB8C87572}"/>
               </a:ext>
             </a:extLst>
           </p:cNvPr>
@@ -7220,7 +6872,7 @@
           <p:cNvPr id="3" name="Title 2">
             <a:extLst>
               <a:ext uri="{FF2B5EF4-FFF2-40B4-BE49-F238E27FC236}">
-                <a16:creationId xmlns="" xmlns:a16="http://schemas.microsoft.com/office/drawing/2014/main" id="{BBB10FF4-8CAC-EB46-A675-41388AFE627D}"/>
+                <a16:creationId xmlns:a16="http://schemas.microsoft.com/office/drawing/2014/main" id="{BBB10FF4-8CAC-EB46-A675-41388AFE627D}"/>
               </a:ext>
             </a:extLst>
           </p:cNvPr>
@@ -7248,7 +6900,7 @@
           <p:cNvPr id="5" name="Picture 4" descr="Graphical user interface, chart, application&#10;&#10;Description automatically generated">
             <a:extLst>
               <a:ext uri="{FF2B5EF4-FFF2-40B4-BE49-F238E27FC236}">
-                <a16:creationId xmlns="" xmlns:a16="http://schemas.microsoft.com/office/drawing/2014/main" id="{34BD57AA-CF61-8D4B-99F0-56A11B84728D}"/>
+                <a16:creationId xmlns:a16="http://schemas.microsoft.com/office/drawing/2014/main" id="{34BD57AA-CF61-8D4B-99F0-56A11B84728D}"/>
               </a:ext>
             </a:extLst>
           </p:cNvPr>
@@ -7292,7 +6944,7 @@
 </p:sld>
 </file>
 
-<file path=ppt/slides/slide19.xml><?xml version="1.0" encoding="utf-8"?>
+<file path=ppt/slides/slide17.xml><?xml version="1.0" encoding="utf-8"?>
 <p:sld xmlns:a="http://schemas.openxmlformats.org/drawingml/2006/main" xmlns:r="http://schemas.openxmlformats.org/officeDocument/2006/relationships" xmlns:p="http://schemas.openxmlformats.org/presentationml/2006/main">
   <p:cSld>
     <p:spTree>
@@ -7346,13 +6998,8 @@
             </a:r>
             <a:r>
               <a:rPr lang="nl-BE" dirty="0"/>
-              <a:t> </a:t>
-            </a:r>
-            <a:r>
-              <a:rPr lang="nl-BE" dirty="0" smtClean="0"/>
-              <a:t>Interface</a:t>
-            </a:r>
-            <a:endParaRPr lang="nl-BE" dirty="0"/>
+              <a:t> Interface</a:t>
+            </a:r>
           </a:p>
           <a:p>
             <a:r>
@@ -7365,21 +7012,17 @@
             </a:r>
             <a:r>
               <a:rPr lang="nl-BE" dirty="0"/>
-              <a:t> </a:t>
-            </a:r>
-            <a:r>
-              <a:rPr lang="nl-BE" dirty="0" smtClean="0"/>
-              <a:t>steps</a:t>
+              <a:t> steps</a:t>
             </a:r>
           </a:p>
           <a:p>
             <a:pPr lvl="1"/>
             <a:r>
-              <a:rPr lang="nl-BE" dirty="0" err="1" smtClean="0"/>
+              <a:rPr lang="nl-BE" dirty="0" err="1"/>
               <a:t>Breaking</a:t>
             </a:r>
             <a:r>
-              <a:rPr lang="nl-BE" dirty="0" smtClean="0"/>
+              <a:rPr lang="nl-BE" dirty="0"/>
               <a:t> </a:t>
             </a:r>
             <a:r>
@@ -7388,20 +7031,15 @@
             </a:r>
             <a:r>
               <a:rPr lang="nl-BE" dirty="0"/>
-              <a:t> </a:t>
-            </a:r>
-            <a:r>
-              <a:rPr lang="nl-BE" dirty="0" smtClean="0"/>
-              <a:t>down</a:t>
+              <a:t> down</a:t>
             </a:r>
           </a:p>
           <a:p>
             <a:pPr lvl="1"/>
             <a:r>
-              <a:rPr lang="nl-BE" dirty="0" smtClean="0"/>
+              <a:rPr lang="nl-BE" dirty="0"/>
               <a:t>Human thinking</a:t>
             </a:r>
-            <a:endParaRPr lang="nl-BE" dirty="0"/>
           </a:p>
           <a:p>
             <a:pPr lvl="1"/>
@@ -7529,6 +7167,570 @@
 </p:sld>
 </file>
 
+<file path=ppt/slides/slide18.xml><?xml version="1.0" encoding="utf-8"?>
+<p:sld xmlns:a="http://schemas.openxmlformats.org/drawingml/2006/main" xmlns:r="http://schemas.openxmlformats.org/officeDocument/2006/relationships" xmlns:p="http://schemas.openxmlformats.org/presentationml/2006/main">
+  <p:cSld>
+    <p:spTree>
+      <p:nvGrpSpPr>
+        <p:cNvPr id="1" name=""/>
+        <p:cNvGrpSpPr/>
+        <p:nvPr/>
+      </p:nvGrpSpPr>
+      <p:grpSpPr>
+        <a:xfrm>
+          <a:off x="0" y="0"/>
+          <a:ext cx="0" cy="0"/>
+          <a:chOff x="0" y="0"/>
+          <a:chExt cx="0" cy="0"/>
+        </a:xfrm>
+      </p:grpSpPr>
+      <p:sp>
+        <p:nvSpPr>
+          <p:cNvPr id="2" name="Tijdelijke aanduiding voor inhoud 1"/>
+          <p:cNvSpPr>
+            <a:spLocks noGrp="1"/>
+          </p:cNvSpPr>
+          <p:nvPr>
+            <p:ph idx="1"/>
+          </p:nvPr>
+        </p:nvSpPr>
+        <p:spPr/>
+        <p:txBody>
+          <a:bodyPr/>
+          <a:lstStyle/>
+          <a:p>
+            <a:r>
+              <a:rPr lang="nl-BE" dirty="0" err="1"/>
+              <a:t>Godot</a:t>
+            </a:r>
+            <a:r>
+              <a:rPr lang="nl-BE" dirty="0"/>
+              <a:t> Engine</a:t>
+            </a:r>
+          </a:p>
+          <a:p>
+            <a:pPr lvl="1"/>
+            <a:r>
+              <a:rPr lang="nl-BE" dirty="0" err="1"/>
+              <a:t>GDscript</a:t>
+            </a:r>
+            <a:endParaRPr lang="nl-BE" dirty="0"/>
+          </a:p>
+          <a:p>
+            <a:pPr lvl="1"/>
+            <a:r>
+              <a:rPr lang="nl-BE" dirty="0" err="1"/>
+              <a:t>External</a:t>
+            </a:r>
+            <a:r>
+              <a:rPr lang="nl-BE" dirty="0"/>
+              <a:t> files</a:t>
+            </a:r>
+          </a:p>
+          <a:p>
+            <a:r>
+              <a:rPr lang="nl-BE" dirty="0"/>
+              <a:t>Steps</a:t>
+            </a:r>
+          </a:p>
+          <a:p>
+            <a:pPr lvl="1"/>
+            <a:r>
+              <a:rPr lang="nl-BE" dirty="0" err="1"/>
+              <a:t>Venn</a:t>
+            </a:r>
+            <a:r>
+              <a:rPr lang="nl-BE" dirty="0"/>
+              <a:t> </a:t>
+            </a:r>
+            <a:r>
+              <a:rPr lang="nl-BE" dirty="0" err="1"/>
+              <a:t>diagrams</a:t>
+            </a:r>
+            <a:endParaRPr lang="nl-BE" dirty="0"/>
+          </a:p>
+          <a:p>
+            <a:pPr lvl="1"/>
+            <a:r>
+              <a:rPr lang="nl-BE" dirty="0"/>
+              <a:t>Basic </a:t>
+            </a:r>
+            <a:r>
+              <a:rPr lang="nl-BE" dirty="0" err="1"/>
+              <a:t>problems</a:t>
+            </a:r>
+            <a:endParaRPr lang="nl-BE" dirty="0"/>
+          </a:p>
+          <a:p>
+            <a:pPr lvl="1"/>
+            <a:r>
+              <a:rPr lang="nl-BE" dirty="0" err="1"/>
+              <a:t>Constraints</a:t>
+            </a:r>
+            <a:endParaRPr lang="nl-BE" dirty="0"/>
+          </a:p>
+          <a:p>
+            <a:r>
+              <a:rPr lang="nl-BE" dirty="0"/>
+              <a:t>Area </a:t>
+            </a:r>
+            <a:r>
+              <a:rPr lang="nl-BE" dirty="0" err="1"/>
+              <a:t>Proportional</a:t>
+            </a:r>
+            <a:r>
+              <a:rPr lang="nl-BE" dirty="0"/>
+              <a:t> </a:t>
+            </a:r>
+            <a:r>
+              <a:rPr lang="nl-BE" dirty="0" err="1"/>
+              <a:t>Venn</a:t>
+            </a:r>
+            <a:endParaRPr lang="nl-BE" dirty="0"/>
+          </a:p>
+          <a:p>
+            <a:pPr lvl="1"/>
+            <a:r>
+              <a:rPr lang="nl-BE" dirty="0" err="1"/>
+              <a:t>Circle</a:t>
+            </a:r>
+            <a:r>
+              <a:rPr lang="nl-BE" dirty="0"/>
+              <a:t> area ~ domain </a:t>
+            </a:r>
+            <a:r>
+              <a:rPr lang="nl-BE" dirty="0" err="1"/>
+              <a:t>size</a:t>
+            </a:r>
+            <a:endParaRPr lang="nl-BE" dirty="0"/>
+          </a:p>
+          <a:p>
+            <a:pPr lvl="1"/>
+            <a:r>
+              <a:rPr lang="nl-BE" dirty="0"/>
+              <a:t>Python </a:t>
+            </a:r>
+            <a:r>
+              <a:rPr lang="nl-BE" dirty="0" err="1"/>
+              <a:t>library</a:t>
+            </a:r>
+            <a:endParaRPr lang="nl-BE" dirty="0"/>
+          </a:p>
+          <a:p>
+            <a:pPr lvl="1"/>
+            <a:endParaRPr lang="nl-BE" dirty="0"/>
+          </a:p>
+          <a:p>
+            <a:endParaRPr lang="nl-BE" dirty="0"/>
+          </a:p>
+        </p:txBody>
+      </p:sp>
+      <p:sp>
+        <p:nvSpPr>
+          <p:cNvPr id="3" name="Titel 2"/>
+          <p:cNvSpPr>
+            <a:spLocks noGrp="1"/>
+          </p:cNvSpPr>
+          <p:nvPr>
+            <p:ph type="title"/>
+          </p:nvPr>
+        </p:nvSpPr>
+        <p:spPr/>
+        <p:txBody>
+          <a:bodyPr>
+            <a:normAutofit/>
+          </a:bodyPr>
+          <a:lstStyle/>
+          <a:p>
+            <a:r>
+              <a:rPr lang="en-GB" dirty="0">
+                <a:effectLst/>
+              </a:rPr>
+              <a:t>Visualization (Implementation)</a:t>
+            </a:r>
+            <a:endParaRPr lang="nl-BE" dirty="0">
+              <a:effectLst/>
+            </a:endParaRPr>
+          </a:p>
+        </p:txBody>
+      </p:sp>
+      <p:sp>
+        <p:nvSpPr>
+          <p:cNvPr id="4" name="AutoShape 2" descr="Pietro.png"/>
+          <p:cNvSpPr>
+            <a:spLocks noChangeAspect="1" noChangeArrowheads="1"/>
+          </p:cNvSpPr>
+          <p:nvPr/>
+        </p:nvSpPr>
+        <p:spPr bwMode="auto">
+          <a:xfrm>
+            <a:off x="155575" y="-144463"/>
+            <a:ext cx="304800" cy="304801"/>
+          </a:xfrm>
+          <a:prstGeom prst="rect">
+            <a:avLst/>
+          </a:prstGeom>
+          <a:noFill/>
+          <a:extLst>
+            <a:ext uri="{909E8E84-426E-40DD-AFC4-6F175D3DCCD1}">
+              <a14:hiddenFill xmlns:a14="http://schemas.microsoft.com/office/drawing/2010/main">
+                <a:solidFill>
+                  <a:srgbClr val="FFFFFF"/>
+                </a:solidFill>
+              </a14:hiddenFill>
+            </a:ext>
+          </a:extLst>
+        </p:spPr>
+        <p:txBody>
+          <a:bodyPr vert="horz" wrap="square" lIns="91440" tIns="45720" rIns="91440" bIns="45720" numCol="1" anchor="t" anchorCtr="0" compatLnSpc="1">
+            <a:prstTxWarp prst="textNoShape">
+              <a:avLst/>
+            </a:prstTxWarp>
+          </a:bodyPr>
+          <a:lstStyle/>
+          <a:p>
+            <a:endParaRPr lang="nl-BE"/>
+          </a:p>
+        </p:txBody>
+      </p:sp>
+      <p:pic>
+        <p:nvPicPr>
+          <p:cNvPr id="2052" name="Picture 4" descr="Venn diagram proportional and color shading with semi-transparency - Stack  Overflow"/>
+          <p:cNvPicPr>
+            <a:picLocks noChangeAspect="1" noChangeArrowheads="1"/>
+          </p:cNvPicPr>
+          <p:nvPr/>
+        </p:nvPicPr>
+        <p:blipFill rotWithShape="1">
+          <a:blip r:embed="rId2" cstate="print">
+            <a:extLst>
+              <a:ext uri="{BEBA8EAE-BF5A-486C-A8C5-ECC9F3942E4B}">
+                <a14:imgProps xmlns:a14="http://schemas.microsoft.com/office/drawing/2010/main">
+                  <a14:imgLayer r:embed="rId3">
+                    <a14:imgEffect>
+                      <a14:backgroundRemoval t="0" b="100000" l="0" r="100000"/>
+                    </a14:imgEffect>
+                  </a14:imgLayer>
+                </a14:imgProps>
+              </a:ext>
+              <a:ext uri="{28A0092B-C50C-407E-A947-70E740481C1C}">
+                <a14:useLocalDpi xmlns:a14="http://schemas.microsoft.com/office/drawing/2010/main" val="0"/>
+              </a:ext>
+            </a:extLst>
+          </a:blip>
+          <a:srcRect t="10081" b="10204"/>
+          <a:stretch/>
+        </p:blipFill>
+        <p:spPr bwMode="auto">
+          <a:xfrm>
+            <a:off x="5317116" y="3212976"/>
+            <a:ext cx="3071308" cy="2448272"/>
+          </a:xfrm>
+          <a:prstGeom prst="rect">
+            <a:avLst/>
+          </a:prstGeom>
+          <a:noFill/>
+          <a:extLst>
+            <a:ext uri="{909E8E84-426E-40DD-AFC4-6F175D3DCCD1}">
+              <a14:hiddenFill xmlns:a14="http://schemas.microsoft.com/office/drawing/2010/main">
+                <a:solidFill>
+                  <a:srgbClr val="FFFFFF"/>
+                </a:solidFill>
+              </a14:hiddenFill>
+            </a:ext>
+          </a:extLst>
+        </p:spPr>
+      </p:pic>
+      <p:sp>
+        <p:nvSpPr>
+          <p:cNvPr id="6" name="AutoShape 2" descr="Godot Engine - Free and open source 2D and 3D game engine"/>
+          <p:cNvSpPr>
+            <a:spLocks noChangeAspect="1" noChangeArrowheads="1"/>
+          </p:cNvSpPr>
+          <p:nvPr/>
+        </p:nvSpPr>
+        <p:spPr bwMode="auto">
+          <a:xfrm>
+            <a:off x="307975" y="7937"/>
+            <a:ext cx="304800" cy="304801"/>
+          </a:xfrm>
+          <a:prstGeom prst="rect">
+            <a:avLst/>
+          </a:prstGeom>
+          <a:noFill/>
+          <a:extLst>
+            <a:ext uri="{909E8E84-426E-40DD-AFC4-6F175D3DCCD1}">
+              <a14:hiddenFill xmlns:a14="http://schemas.microsoft.com/office/drawing/2010/main">
+                <a:solidFill>
+                  <a:srgbClr val="FFFFFF"/>
+                </a:solidFill>
+              </a14:hiddenFill>
+            </a:ext>
+          </a:extLst>
+        </p:spPr>
+        <p:txBody>
+          <a:bodyPr vert="horz" wrap="square" lIns="91440" tIns="45720" rIns="91440" bIns="45720" numCol="1" anchor="t" anchorCtr="0" compatLnSpc="1">
+            <a:prstTxWarp prst="textNoShape">
+              <a:avLst/>
+            </a:prstTxWarp>
+          </a:bodyPr>
+          <a:lstStyle/>
+          <a:p>
+            <a:endParaRPr lang="nl-BE"/>
+          </a:p>
+        </p:txBody>
+      </p:sp>
+      <p:sp>
+        <p:nvSpPr>
+          <p:cNvPr id="7" name="AutoShape 4" descr="Godot Engine - Free and open source 2D and 3D game engine"/>
+          <p:cNvSpPr>
+            <a:spLocks noChangeAspect="1" noChangeArrowheads="1"/>
+          </p:cNvSpPr>
+          <p:nvPr/>
+        </p:nvSpPr>
+        <p:spPr bwMode="auto">
+          <a:xfrm>
+            <a:off x="460375" y="160337"/>
+            <a:ext cx="304800" cy="304801"/>
+          </a:xfrm>
+          <a:prstGeom prst="rect">
+            <a:avLst/>
+          </a:prstGeom>
+          <a:noFill/>
+          <a:extLst>
+            <a:ext uri="{909E8E84-426E-40DD-AFC4-6F175D3DCCD1}">
+              <a14:hiddenFill xmlns:a14="http://schemas.microsoft.com/office/drawing/2010/main">
+                <a:solidFill>
+                  <a:srgbClr val="FFFFFF"/>
+                </a:solidFill>
+              </a14:hiddenFill>
+            </a:ext>
+          </a:extLst>
+        </p:spPr>
+        <p:txBody>
+          <a:bodyPr vert="horz" wrap="square" lIns="91440" tIns="45720" rIns="91440" bIns="45720" numCol="1" anchor="t" anchorCtr="0" compatLnSpc="1">
+            <a:prstTxWarp prst="textNoShape">
+              <a:avLst/>
+            </a:prstTxWarp>
+          </a:bodyPr>
+          <a:lstStyle/>
+          <a:p>
+            <a:endParaRPr lang="nl-BE"/>
+          </a:p>
+        </p:txBody>
+      </p:sp>
+      <p:pic>
+        <p:nvPicPr>
+          <p:cNvPr id="2053" name="Picture 5"/>
+          <p:cNvPicPr>
+            <a:picLocks noChangeAspect="1" noChangeArrowheads="1"/>
+          </p:cNvPicPr>
+          <p:nvPr/>
+        </p:nvPicPr>
+        <p:blipFill>
+          <a:blip r:embed="rId4" cstate="print">
+            <a:extLst>
+              <a:ext uri="{28A0092B-C50C-407E-A947-70E740481C1C}">
+                <a14:useLocalDpi xmlns:a14="http://schemas.microsoft.com/office/drawing/2010/main" val="0"/>
+              </a:ext>
+            </a:extLst>
+          </a:blip>
+          <a:srcRect/>
+          <a:stretch>
+            <a:fillRect/>
+          </a:stretch>
+        </p:blipFill>
+        <p:spPr bwMode="auto">
+          <a:xfrm>
+            <a:off x="4427983" y="1680736"/>
+            <a:ext cx="3828035" cy="1388224"/>
+          </a:xfrm>
+          <a:prstGeom prst="rect">
+            <a:avLst/>
+          </a:prstGeom>
+          <a:noFill/>
+          <a:ln>
+            <a:noFill/>
+          </a:ln>
+          <a:effectLst/>
+          <a:extLst>
+            <a:ext uri="{909E8E84-426E-40DD-AFC4-6F175D3DCCD1}">
+              <a14:hiddenFill xmlns:a14="http://schemas.microsoft.com/office/drawing/2010/main">
+                <a:solidFill>
+                  <a:schemeClr val="accent1"/>
+                </a:solidFill>
+              </a14:hiddenFill>
+            </a:ext>
+            <a:ext uri="{91240B29-F687-4F45-9708-019B960494DF}">
+              <a14:hiddenLine xmlns:a14="http://schemas.microsoft.com/office/drawing/2010/main" w="9525">
+                <a:solidFill>
+                  <a:schemeClr val="tx1"/>
+                </a:solidFill>
+                <a:miter lim="800000"/>
+                <a:headEnd/>
+                <a:tailEnd/>
+              </a14:hiddenLine>
+            </a:ext>
+            <a:ext uri="{AF507438-7753-43E0-B8FC-AC1667EBCBE1}">
+              <a14:hiddenEffects xmlns:a14="http://schemas.microsoft.com/office/drawing/2010/main">
+                <a:effectLst>
+                  <a:outerShdw dist="35921" dir="2700000" algn="ctr" rotWithShape="0">
+                    <a:schemeClr val="bg2"/>
+                  </a:outerShdw>
+                </a:effectLst>
+              </a14:hiddenEffects>
+            </a:ext>
+          </a:extLst>
+        </p:spPr>
+      </p:pic>
+    </p:spTree>
+    <p:extLst>
+      <p:ext uri="{BB962C8B-B14F-4D97-AF65-F5344CB8AC3E}">
+        <p14:creationId xmlns:p14="http://schemas.microsoft.com/office/powerpoint/2010/main" val="4144239806"/>
+      </p:ext>
+    </p:extLst>
+  </p:cSld>
+  <p:clrMapOvr>
+    <a:masterClrMapping/>
+  </p:clrMapOvr>
+</p:sld>
+</file>
+
+<file path=ppt/slides/slide19.xml><?xml version="1.0" encoding="utf-8"?>
+<p:sld xmlns:a="http://schemas.openxmlformats.org/drawingml/2006/main" xmlns:r="http://schemas.openxmlformats.org/officeDocument/2006/relationships" xmlns:p="http://schemas.openxmlformats.org/presentationml/2006/main">
+  <p:cSld>
+    <p:spTree>
+      <p:nvGrpSpPr>
+        <p:cNvPr id="1" name=""/>
+        <p:cNvGrpSpPr/>
+        <p:nvPr/>
+      </p:nvGrpSpPr>
+      <p:grpSpPr>
+        <a:xfrm>
+          <a:off x="0" y="0"/>
+          <a:ext cx="0" cy="0"/>
+          <a:chOff x="0" y="0"/>
+          <a:chExt cx="0" cy="0"/>
+        </a:xfrm>
+      </p:grpSpPr>
+      <p:sp>
+        <p:nvSpPr>
+          <p:cNvPr id="4" name="AutoShape 2" descr="Pietro.png"/>
+          <p:cNvSpPr>
+            <a:spLocks noChangeAspect="1" noChangeArrowheads="1"/>
+          </p:cNvSpPr>
+          <p:nvPr/>
+        </p:nvSpPr>
+        <p:spPr bwMode="auto">
+          <a:xfrm>
+            <a:off x="155575" y="-144463"/>
+            <a:ext cx="304800" cy="304801"/>
+          </a:xfrm>
+          <a:prstGeom prst="rect">
+            <a:avLst/>
+          </a:prstGeom>
+          <a:noFill/>
+          <a:extLst>
+            <a:ext uri="{909E8E84-426E-40DD-AFC4-6F175D3DCCD1}">
+              <a14:hiddenFill xmlns:a14="http://schemas.microsoft.com/office/drawing/2010/main">
+                <a:solidFill>
+                  <a:srgbClr val="FFFFFF"/>
+                </a:solidFill>
+              </a14:hiddenFill>
+            </a:ext>
+          </a:extLst>
+        </p:spPr>
+        <p:txBody>
+          <a:bodyPr vert="horz" wrap="square" lIns="91440" tIns="45720" rIns="91440" bIns="45720" numCol="1" anchor="t" anchorCtr="0" compatLnSpc="1">
+            <a:prstTxWarp prst="textNoShape">
+              <a:avLst/>
+            </a:prstTxWarp>
+          </a:bodyPr>
+          <a:lstStyle/>
+          <a:p>
+            <a:endParaRPr lang="nl-BE"/>
+          </a:p>
+        </p:txBody>
+      </p:sp>
+      <p:sp>
+        <p:nvSpPr>
+          <p:cNvPr id="11" name="Titel 1"/>
+          <p:cNvSpPr txBox="1">
+            <a:spLocks/>
+          </p:cNvSpPr>
+          <p:nvPr/>
+        </p:nvSpPr>
+        <p:spPr>
+          <a:xfrm>
+            <a:off x="685800" y="2391327"/>
+            <a:ext cx="7772400" cy="1829761"/>
+          </a:xfrm>
+          <a:prstGeom prst="rect">
+            <a:avLst/>
+          </a:prstGeom>
+        </p:spPr>
+        <p:txBody>
+          <a:bodyPr vert="horz" rtlCol="0" anchor="ctr">
+            <a:normAutofit fontScale="97500"/>
+            <a:scene3d>
+              <a:camera prst="orthographicFront"/>
+              <a:lightRig rig="soft" dir="t"/>
+            </a:scene3d>
+            <a:sp3d prstMaterial="softEdge">
+              <a:bevelT w="25400" h="25400"/>
+            </a:sp3d>
+          </a:bodyPr>
+          <a:lstStyle>
+            <a:lvl1pPr algn="l" rtl="0" eaLnBrk="1" latinLnBrk="0" hangingPunct="1">
+              <a:spcBef>
+                <a:spcPct val="0"/>
+              </a:spcBef>
+              <a:buNone/>
+              <a:defRPr kumimoji="0" sz="4100" b="1" kern="1200">
+                <a:solidFill>
+                  <a:schemeClr val="tx2"/>
+                </a:solidFill>
+                <a:effectLst>
+                  <a:outerShdw blurRad="31750" dist="25400" dir="5400000" algn="tl" rotWithShape="0">
+                    <a:srgbClr val="000000">
+                      <a:alpha val="25000"/>
+                    </a:srgbClr>
+                  </a:outerShdw>
+                </a:effectLst>
+                <a:latin typeface="+mj-lt"/>
+                <a:ea typeface="+mj-ea"/>
+                <a:cs typeface="+mj-cs"/>
+              </a:defRPr>
+            </a:lvl1pPr>
+            <a:extLst/>
+          </a:lstStyle>
+          <a:p>
+            <a:pPr algn="ctr"/>
+            <a:r>
+              <a:rPr lang="en-US" sz="4500" dirty="0"/>
+              <a:t>Questions</a:t>
+            </a:r>
+            <a:r>
+              <a:rPr lang="en-US" dirty="0"/>
+              <a:t>?</a:t>
+            </a:r>
+            <a:endParaRPr lang="nl-BE" dirty="0"/>
+          </a:p>
+        </p:txBody>
+      </p:sp>
+    </p:spTree>
+    <p:extLst>
+      <p:ext uri="{BB962C8B-B14F-4D97-AF65-F5344CB8AC3E}">
+        <p14:creationId xmlns:p14="http://schemas.microsoft.com/office/powerpoint/2010/main" val="3256963629"/>
+      </p:ext>
+    </p:extLst>
+  </p:cSld>
+  <p:clrMapOvr>
+    <a:masterClrMapping/>
+  </p:clrMapOvr>
+</p:sld>
+</file>
+
 <file path=ppt/slides/slide2.xml><?xml version="1.0" encoding="utf-8"?>
 <p:sld xmlns:a="http://schemas.openxmlformats.org/drawingml/2006/main" xmlns:r="http://schemas.openxmlformats.org/officeDocument/2006/relationships" xmlns:p="http://schemas.openxmlformats.org/presentationml/2006/main">
   <p:cSld>
@@ -7562,15 +7764,15 @@
           <a:lstStyle/>
           <a:p>
             <a:r>
-              <a:rPr lang="nl-BE" dirty="0" err="1" smtClean="0"/>
+              <a:rPr lang="nl-BE" dirty="0" err="1"/>
               <a:t>Cfr</a:t>
             </a:r>
             <a:r>
-              <a:rPr lang="nl-BE" dirty="0" smtClean="0"/>
+              <a:rPr lang="nl-BE" dirty="0"/>
               <a:t>. </a:t>
             </a:r>
             <a:r>
-              <a:rPr lang="nl-BE" dirty="0" err="1" smtClean="0"/>
+              <a:rPr lang="nl-BE" dirty="0" err="1"/>
               <a:t>Symbolab</a:t>
             </a:r>
             <a:endParaRPr lang="nl-BE" dirty="0"/>
@@ -7578,85 +7780,83 @@
           <a:p>
             <a:pPr lvl="1"/>
             <a:r>
-              <a:rPr lang="nl-BE" dirty="0" smtClean="0"/>
+              <a:rPr lang="nl-BE" dirty="0"/>
               <a:t>Mathematical </a:t>
             </a:r>
             <a:r>
-              <a:rPr lang="nl-BE" dirty="0" err="1" smtClean="0"/>
+              <a:rPr lang="nl-BE" dirty="0" err="1"/>
               <a:t>problems</a:t>
             </a:r>
-            <a:endParaRPr lang="nl-BE" dirty="0" smtClean="0"/>
+            <a:endParaRPr lang="nl-BE" dirty="0"/>
           </a:p>
           <a:p>
             <a:pPr lvl="1"/>
             <a:r>
-              <a:rPr lang="nl-BE" dirty="0" err="1" smtClean="0"/>
+              <a:rPr lang="nl-BE" dirty="0" err="1"/>
               <a:t>Step-by-step</a:t>
             </a:r>
             <a:r>
-              <a:rPr lang="nl-BE" dirty="0" smtClean="0"/>
+              <a:rPr lang="nl-BE" dirty="0"/>
               <a:t> </a:t>
             </a:r>
             <a:r>
-              <a:rPr lang="nl-BE" dirty="0" err="1" smtClean="0"/>
+              <a:rPr lang="nl-BE" dirty="0" err="1"/>
               <a:t>solving</a:t>
             </a:r>
-            <a:endParaRPr lang="nl-BE" dirty="0" smtClean="0"/>
+            <a:endParaRPr lang="nl-BE" dirty="0"/>
           </a:p>
           <a:p>
             <a:pPr lvl="1"/>
             <a:r>
-              <a:rPr lang="nl-BE" dirty="0" smtClean="0"/>
+              <a:rPr lang="nl-BE" dirty="0"/>
               <a:t>Help Students</a:t>
             </a:r>
+          </a:p>
+          <a:p>
+            <a:r>
+              <a:rPr lang="nl-BE" dirty="0" err="1"/>
+              <a:t>Our</a:t>
+            </a:r>
+            <a:r>
+              <a:rPr lang="nl-BE" dirty="0"/>
+              <a:t> </a:t>
+            </a:r>
+            <a:r>
+              <a:rPr lang="nl-BE" dirty="0" err="1"/>
+              <a:t>Visualization</a:t>
+            </a:r>
             <a:endParaRPr lang="nl-BE" dirty="0"/>
           </a:p>
           <a:p>
-            <a:r>
-              <a:rPr lang="nl-BE" dirty="0" err="1" smtClean="0"/>
-              <a:t>Our</a:t>
-            </a:r>
-            <a:r>
-              <a:rPr lang="nl-BE" dirty="0" smtClean="0"/>
+            <a:pPr lvl="1"/>
+            <a:r>
+              <a:rPr lang="nl-BE" dirty="0" err="1"/>
+              <a:t>Didactic</a:t>
+            </a:r>
+            <a:r>
+              <a:rPr lang="nl-BE" dirty="0"/>
+              <a:t> tool</a:t>
+            </a:r>
+          </a:p>
+          <a:p>
+            <a:pPr lvl="1"/>
+            <a:r>
+              <a:rPr lang="nl-BE" dirty="0"/>
+              <a:t>Focus = Combinatorics</a:t>
+            </a:r>
+          </a:p>
+          <a:p>
+            <a:pPr lvl="1"/>
+            <a:r>
+              <a:rPr lang="nl-BE" dirty="0" err="1"/>
+              <a:t>Lifted</a:t>
+            </a:r>
+            <a:r>
+              <a:rPr lang="nl-BE" dirty="0"/>
               <a:t> </a:t>
             </a:r>
             <a:r>
-              <a:rPr lang="nl-BE" dirty="0" err="1" smtClean="0"/>
-              <a:t>Visualization</a:t>
-            </a:r>
-            <a:endParaRPr lang="nl-BE" dirty="0" smtClean="0"/>
-          </a:p>
-          <a:p>
-            <a:pPr lvl="1"/>
-            <a:r>
-              <a:rPr lang="nl-BE" dirty="0" err="1" smtClean="0"/>
-              <a:t>Didactic</a:t>
-            </a:r>
-            <a:r>
-              <a:rPr lang="nl-BE" dirty="0" smtClean="0"/>
-              <a:t> tool</a:t>
-            </a:r>
-            <a:endParaRPr lang="nl-BE" dirty="0"/>
-          </a:p>
-          <a:p>
-            <a:pPr lvl="1"/>
-            <a:r>
-              <a:rPr lang="nl-BE" dirty="0" smtClean="0"/>
-              <a:t>Focus = Combinatorics</a:t>
-            </a:r>
-          </a:p>
-          <a:p>
-            <a:pPr lvl="1"/>
-            <a:r>
-              <a:rPr lang="nl-BE" dirty="0" err="1" smtClean="0"/>
-              <a:t>Lifted</a:t>
-            </a:r>
-            <a:r>
-              <a:rPr lang="nl-BE" dirty="0" smtClean="0"/>
-              <a:t> </a:t>
-            </a:r>
-            <a:r>
-              <a:rPr lang="nl-BE" dirty="0" err="1" smtClean="0"/>
+              <a:rPr lang="nl-BE" dirty="0" err="1"/>
               <a:t>Reasoning</a:t>
             </a:r>
             <a:endParaRPr lang="nl-BE" dirty="0"/>
@@ -7679,22 +7879,21 @@
           <a:lstStyle/>
           <a:p>
             <a:r>
-              <a:rPr lang="nl-BE" dirty="0" err="1" smtClean="0"/>
+              <a:rPr lang="nl-BE" dirty="0" err="1"/>
               <a:t>Why</a:t>
             </a:r>
             <a:r>
-              <a:rPr lang="nl-BE" dirty="0" smtClean="0"/>
+              <a:rPr lang="nl-BE" dirty="0"/>
               <a:t> is </a:t>
             </a:r>
             <a:r>
-              <a:rPr lang="nl-BE" dirty="0" err="1" smtClean="0"/>
+              <a:rPr lang="nl-BE" dirty="0" err="1"/>
               <a:t>it</a:t>
             </a:r>
             <a:r>
-              <a:rPr lang="nl-BE" dirty="0" smtClean="0"/>
+              <a:rPr lang="nl-BE" dirty="0"/>
               <a:t> Relevant?</a:t>
             </a:r>
-            <a:endParaRPr lang="nl-BE" dirty="0"/>
           </a:p>
         </p:txBody>
       </p:sp>
@@ -7782,579 +7981,6 @@
 </p:sld>
 </file>
 
-<file path=ppt/slides/slide20.xml><?xml version="1.0" encoding="utf-8"?>
-<p:sld xmlns:a="http://schemas.openxmlformats.org/drawingml/2006/main" xmlns:r="http://schemas.openxmlformats.org/officeDocument/2006/relationships" xmlns:p="http://schemas.openxmlformats.org/presentationml/2006/main">
-  <p:cSld>
-    <p:spTree>
-      <p:nvGrpSpPr>
-        <p:cNvPr id="1" name=""/>
-        <p:cNvGrpSpPr/>
-        <p:nvPr/>
-      </p:nvGrpSpPr>
-      <p:grpSpPr>
-        <a:xfrm>
-          <a:off x="0" y="0"/>
-          <a:ext cx="0" cy="0"/>
-          <a:chOff x="0" y="0"/>
-          <a:chExt cx="0" cy="0"/>
-        </a:xfrm>
-      </p:grpSpPr>
-      <p:sp>
-        <p:nvSpPr>
-          <p:cNvPr id="2" name="Tijdelijke aanduiding voor inhoud 1"/>
-          <p:cNvSpPr>
-            <a:spLocks noGrp="1"/>
-          </p:cNvSpPr>
-          <p:nvPr>
-            <p:ph idx="1"/>
-          </p:nvPr>
-        </p:nvSpPr>
-        <p:spPr/>
-        <p:txBody>
-          <a:bodyPr/>
-          <a:lstStyle/>
-          <a:p>
-            <a:r>
-              <a:rPr lang="nl-BE" dirty="0" err="1" smtClean="0"/>
-              <a:t>Godot</a:t>
-            </a:r>
-            <a:r>
-              <a:rPr lang="nl-BE" dirty="0" smtClean="0"/>
-              <a:t> Engine</a:t>
-            </a:r>
-            <a:endParaRPr lang="nl-BE" dirty="0"/>
-          </a:p>
-          <a:p>
-            <a:pPr lvl="1"/>
-            <a:r>
-              <a:rPr lang="nl-BE" dirty="0" err="1" smtClean="0"/>
-              <a:t>GDscript</a:t>
-            </a:r>
-            <a:endParaRPr lang="nl-BE" dirty="0" smtClean="0"/>
-          </a:p>
-          <a:p>
-            <a:pPr lvl="1"/>
-            <a:r>
-              <a:rPr lang="nl-BE" dirty="0" err="1" smtClean="0"/>
-              <a:t>External</a:t>
-            </a:r>
-            <a:r>
-              <a:rPr lang="nl-BE" dirty="0" smtClean="0"/>
-              <a:t> files</a:t>
-            </a:r>
-          </a:p>
-          <a:p>
-            <a:r>
-              <a:rPr lang="nl-BE" dirty="0" smtClean="0"/>
-              <a:t>Steps</a:t>
-            </a:r>
-          </a:p>
-          <a:p>
-            <a:pPr lvl="1"/>
-            <a:r>
-              <a:rPr lang="nl-BE" dirty="0" err="1" smtClean="0"/>
-              <a:t>Venn</a:t>
-            </a:r>
-            <a:r>
-              <a:rPr lang="nl-BE" dirty="0" smtClean="0"/>
-              <a:t> </a:t>
-            </a:r>
-            <a:r>
-              <a:rPr lang="nl-BE" dirty="0" err="1"/>
-              <a:t>d</a:t>
-            </a:r>
-            <a:r>
-              <a:rPr lang="nl-BE" dirty="0" err="1" smtClean="0"/>
-              <a:t>iagrams</a:t>
-            </a:r>
-            <a:endParaRPr lang="nl-BE" dirty="0" smtClean="0"/>
-          </a:p>
-          <a:p>
-            <a:pPr lvl="1"/>
-            <a:r>
-              <a:rPr lang="nl-BE" dirty="0" smtClean="0"/>
-              <a:t>Basic </a:t>
-            </a:r>
-            <a:r>
-              <a:rPr lang="nl-BE" dirty="0" err="1" smtClean="0"/>
-              <a:t>problems</a:t>
-            </a:r>
-            <a:endParaRPr lang="nl-BE" dirty="0" smtClean="0"/>
-          </a:p>
-          <a:p>
-            <a:pPr lvl="1"/>
-            <a:r>
-              <a:rPr lang="nl-BE" dirty="0" err="1" smtClean="0"/>
-              <a:t>Constraints</a:t>
-            </a:r>
-            <a:endParaRPr lang="nl-BE" dirty="0"/>
-          </a:p>
-          <a:p>
-            <a:r>
-              <a:rPr lang="nl-BE" dirty="0" smtClean="0"/>
-              <a:t>Area </a:t>
-            </a:r>
-            <a:r>
-              <a:rPr lang="nl-BE" dirty="0" err="1" smtClean="0"/>
-              <a:t>Proportional</a:t>
-            </a:r>
-            <a:r>
-              <a:rPr lang="nl-BE" dirty="0" smtClean="0"/>
-              <a:t> </a:t>
-            </a:r>
-            <a:r>
-              <a:rPr lang="nl-BE" dirty="0" err="1" smtClean="0"/>
-              <a:t>Venn</a:t>
-            </a:r>
-            <a:endParaRPr lang="nl-BE" dirty="0" smtClean="0"/>
-          </a:p>
-          <a:p>
-            <a:pPr lvl="1"/>
-            <a:r>
-              <a:rPr lang="nl-BE" dirty="0" err="1" smtClean="0"/>
-              <a:t>Circle</a:t>
-            </a:r>
-            <a:r>
-              <a:rPr lang="nl-BE" dirty="0" smtClean="0"/>
-              <a:t> </a:t>
-            </a:r>
-            <a:r>
-              <a:rPr lang="nl-BE" dirty="0"/>
-              <a:t>area ~ domain </a:t>
-            </a:r>
-            <a:r>
-              <a:rPr lang="nl-BE" dirty="0" err="1" smtClean="0"/>
-              <a:t>size</a:t>
-            </a:r>
-            <a:endParaRPr lang="nl-BE" dirty="0" smtClean="0"/>
-          </a:p>
-          <a:p>
-            <a:pPr lvl="1"/>
-            <a:r>
-              <a:rPr lang="nl-BE" dirty="0" smtClean="0"/>
-              <a:t>Python </a:t>
-            </a:r>
-            <a:r>
-              <a:rPr lang="nl-BE" dirty="0" err="1" smtClean="0"/>
-              <a:t>library</a:t>
-            </a:r>
-            <a:endParaRPr lang="nl-BE" dirty="0" smtClean="0"/>
-          </a:p>
-          <a:p>
-            <a:pPr lvl="1"/>
-            <a:endParaRPr lang="nl-BE" dirty="0"/>
-          </a:p>
-          <a:p>
-            <a:endParaRPr lang="nl-BE" dirty="0"/>
-          </a:p>
-        </p:txBody>
-      </p:sp>
-      <p:sp>
-        <p:nvSpPr>
-          <p:cNvPr id="3" name="Titel 2"/>
-          <p:cNvSpPr>
-            <a:spLocks noGrp="1"/>
-          </p:cNvSpPr>
-          <p:nvPr>
-            <p:ph type="title"/>
-          </p:nvPr>
-        </p:nvSpPr>
-        <p:spPr/>
-        <p:txBody>
-          <a:bodyPr>
-            <a:normAutofit/>
-          </a:bodyPr>
-          <a:lstStyle/>
-          <a:p>
-            <a:r>
-              <a:rPr lang="en-GB" dirty="0" smtClean="0">
-                <a:effectLst/>
-              </a:rPr>
-              <a:t>Visualization (Implementation)</a:t>
-            </a:r>
-            <a:endParaRPr lang="nl-BE" dirty="0">
-              <a:effectLst/>
-            </a:endParaRPr>
-          </a:p>
-        </p:txBody>
-      </p:sp>
-      <p:sp>
-        <p:nvSpPr>
-          <p:cNvPr id="4" name="AutoShape 2" descr="Pietro.png"/>
-          <p:cNvSpPr>
-            <a:spLocks noChangeAspect="1" noChangeArrowheads="1"/>
-          </p:cNvSpPr>
-          <p:nvPr/>
-        </p:nvSpPr>
-        <p:spPr bwMode="auto">
-          <a:xfrm>
-            <a:off x="155575" y="-144463"/>
-            <a:ext cx="304800" cy="304801"/>
-          </a:xfrm>
-          <a:prstGeom prst="rect">
-            <a:avLst/>
-          </a:prstGeom>
-          <a:noFill/>
-          <a:extLst>
-            <a:ext uri="{909E8E84-426E-40DD-AFC4-6F175D3DCCD1}">
-              <a14:hiddenFill xmlns:a14="http://schemas.microsoft.com/office/drawing/2010/main">
-                <a:solidFill>
-                  <a:srgbClr val="FFFFFF"/>
-                </a:solidFill>
-              </a14:hiddenFill>
-            </a:ext>
-          </a:extLst>
-        </p:spPr>
-        <p:txBody>
-          <a:bodyPr vert="horz" wrap="square" lIns="91440" tIns="45720" rIns="91440" bIns="45720" numCol="1" anchor="t" anchorCtr="0" compatLnSpc="1">
-            <a:prstTxWarp prst="textNoShape">
-              <a:avLst/>
-            </a:prstTxWarp>
-          </a:bodyPr>
-          <a:lstStyle/>
-          <a:p>
-            <a:endParaRPr lang="nl-BE"/>
-          </a:p>
-        </p:txBody>
-      </p:sp>
-      <p:pic>
-        <p:nvPicPr>
-          <p:cNvPr id="2052" name="Picture 4" descr="Venn diagram proportional and color shading with semi-transparency - Stack  Overflow"/>
-          <p:cNvPicPr>
-            <a:picLocks noChangeAspect="1" noChangeArrowheads="1"/>
-          </p:cNvPicPr>
-          <p:nvPr/>
-        </p:nvPicPr>
-        <p:blipFill rotWithShape="1">
-          <a:blip r:embed="rId2" cstate="print">
-            <a:extLst>
-              <a:ext uri="{BEBA8EAE-BF5A-486C-A8C5-ECC9F3942E4B}">
-                <a14:imgProps xmlns:a14="http://schemas.microsoft.com/office/drawing/2010/main">
-                  <a14:imgLayer r:embed="rId3">
-                    <a14:imgEffect>
-                      <a14:backgroundRemoval t="0" b="100000" l="0" r="100000"/>
-                    </a14:imgEffect>
-                  </a14:imgLayer>
-                </a14:imgProps>
-              </a:ext>
-              <a:ext uri="{28A0092B-C50C-407E-A947-70E740481C1C}">
-                <a14:useLocalDpi xmlns:a14="http://schemas.microsoft.com/office/drawing/2010/main" val="0"/>
-              </a:ext>
-            </a:extLst>
-          </a:blip>
-          <a:srcRect t="10081" b="10204"/>
-          <a:stretch/>
-        </p:blipFill>
-        <p:spPr bwMode="auto">
-          <a:xfrm>
-            <a:off x="5317116" y="3212976"/>
-            <a:ext cx="3071308" cy="2448272"/>
-          </a:xfrm>
-          <a:prstGeom prst="rect">
-            <a:avLst/>
-          </a:prstGeom>
-          <a:noFill/>
-          <a:extLst>
-            <a:ext uri="{909E8E84-426E-40DD-AFC4-6F175D3DCCD1}">
-              <a14:hiddenFill xmlns:a14="http://schemas.microsoft.com/office/drawing/2010/main">
-                <a:solidFill>
-                  <a:srgbClr val="FFFFFF"/>
-                </a:solidFill>
-              </a14:hiddenFill>
-            </a:ext>
-          </a:extLst>
-        </p:spPr>
-      </p:pic>
-      <p:sp>
-        <p:nvSpPr>
-          <p:cNvPr id="6" name="AutoShape 2" descr="Godot Engine - Free and open source 2D and 3D game engine"/>
-          <p:cNvSpPr>
-            <a:spLocks noChangeAspect="1" noChangeArrowheads="1"/>
-          </p:cNvSpPr>
-          <p:nvPr/>
-        </p:nvSpPr>
-        <p:spPr bwMode="auto">
-          <a:xfrm>
-            <a:off x="307975" y="7937"/>
-            <a:ext cx="304800" cy="304801"/>
-          </a:xfrm>
-          <a:prstGeom prst="rect">
-            <a:avLst/>
-          </a:prstGeom>
-          <a:noFill/>
-          <a:extLst>
-            <a:ext uri="{909E8E84-426E-40DD-AFC4-6F175D3DCCD1}">
-              <a14:hiddenFill xmlns:a14="http://schemas.microsoft.com/office/drawing/2010/main">
-                <a:solidFill>
-                  <a:srgbClr val="FFFFFF"/>
-                </a:solidFill>
-              </a14:hiddenFill>
-            </a:ext>
-          </a:extLst>
-        </p:spPr>
-        <p:txBody>
-          <a:bodyPr vert="horz" wrap="square" lIns="91440" tIns="45720" rIns="91440" bIns="45720" numCol="1" anchor="t" anchorCtr="0" compatLnSpc="1">
-            <a:prstTxWarp prst="textNoShape">
-              <a:avLst/>
-            </a:prstTxWarp>
-          </a:bodyPr>
-          <a:lstStyle/>
-          <a:p>
-            <a:endParaRPr lang="nl-BE"/>
-          </a:p>
-        </p:txBody>
-      </p:sp>
-      <p:sp>
-        <p:nvSpPr>
-          <p:cNvPr id="7" name="AutoShape 4" descr="Godot Engine - Free and open source 2D and 3D game engine"/>
-          <p:cNvSpPr>
-            <a:spLocks noChangeAspect="1" noChangeArrowheads="1"/>
-          </p:cNvSpPr>
-          <p:nvPr/>
-        </p:nvSpPr>
-        <p:spPr bwMode="auto">
-          <a:xfrm>
-            <a:off x="460375" y="160337"/>
-            <a:ext cx="304800" cy="304801"/>
-          </a:xfrm>
-          <a:prstGeom prst="rect">
-            <a:avLst/>
-          </a:prstGeom>
-          <a:noFill/>
-          <a:extLst>
-            <a:ext uri="{909E8E84-426E-40DD-AFC4-6F175D3DCCD1}">
-              <a14:hiddenFill xmlns:a14="http://schemas.microsoft.com/office/drawing/2010/main">
-                <a:solidFill>
-                  <a:srgbClr val="FFFFFF"/>
-                </a:solidFill>
-              </a14:hiddenFill>
-            </a:ext>
-          </a:extLst>
-        </p:spPr>
-        <p:txBody>
-          <a:bodyPr vert="horz" wrap="square" lIns="91440" tIns="45720" rIns="91440" bIns="45720" numCol="1" anchor="t" anchorCtr="0" compatLnSpc="1">
-            <a:prstTxWarp prst="textNoShape">
-              <a:avLst/>
-            </a:prstTxWarp>
-          </a:bodyPr>
-          <a:lstStyle/>
-          <a:p>
-            <a:endParaRPr lang="nl-BE"/>
-          </a:p>
-        </p:txBody>
-      </p:sp>
-      <p:pic>
-        <p:nvPicPr>
-          <p:cNvPr id="2053" name="Picture 5"/>
-          <p:cNvPicPr>
-            <a:picLocks noChangeAspect="1" noChangeArrowheads="1"/>
-          </p:cNvPicPr>
-          <p:nvPr/>
-        </p:nvPicPr>
-        <p:blipFill>
-          <a:blip r:embed="rId4" cstate="print">
-            <a:extLst>
-              <a:ext uri="{28A0092B-C50C-407E-A947-70E740481C1C}">
-                <a14:useLocalDpi xmlns:a14="http://schemas.microsoft.com/office/drawing/2010/main" val="0"/>
-              </a:ext>
-            </a:extLst>
-          </a:blip>
-          <a:srcRect/>
-          <a:stretch>
-            <a:fillRect/>
-          </a:stretch>
-        </p:blipFill>
-        <p:spPr bwMode="auto">
-          <a:xfrm>
-            <a:off x="4427983" y="1680736"/>
-            <a:ext cx="3828035" cy="1388224"/>
-          </a:xfrm>
-          <a:prstGeom prst="rect">
-            <a:avLst/>
-          </a:prstGeom>
-          <a:noFill/>
-          <a:ln>
-            <a:noFill/>
-          </a:ln>
-          <a:effectLst/>
-          <a:extLst>
-            <a:ext uri="{909E8E84-426E-40DD-AFC4-6F175D3DCCD1}">
-              <a14:hiddenFill xmlns:a14="http://schemas.microsoft.com/office/drawing/2010/main">
-                <a:solidFill>
-                  <a:schemeClr val="accent1"/>
-                </a:solidFill>
-              </a14:hiddenFill>
-            </a:ext>
-            <a:ext uri="{91240B29-F687-4F45-9708-019B960494DF}">
-              <a14:hiddenLine xmlns:a14="http://schemas.microsoft.com/office/drawing/2010/main" w="9525">
-                <a:solidFill>
-                  <a:schemeClr val="tx1"/>
-                </a:solidFill>
-                <a:miter lim="800000"/>
-                <a:headEnd/>
-                <a:tailEnd/>
-              </a14:hiddenLine>
-            </a:ext>
-            <a:ext uri="{AF507438-7753-43E0-B8FC-AC1667EBCBE1}">
-              <a14:hiddenEffects xmlns:a14="http://schemas.microsoft.com/office/drawing/2010/main">
-                <a:effectLst>
-                  <a:outerShdw dist="35921" dir="2700000" algn="ctr" rotWithShape="0">
-                    <a:schemeClr val="bg2"/>
-                  </a:outerShdw>
-                </a:effectLst>
-              </a14:hiddenEffects>
-            </a:ext>
-          </a:extLst>
-        </p:spPr>
-      </p:pic>
-    </p:spTree>
-    <p:extLst>
-      <p:ext uri="{BB962C8B-B14F-4D97-AF65-F5344CB8AC3E}">
-        <p14:creationId xmlns:p14="http://schemas.microsoft.com/office/powerpoint/2010/main" val="4144239806"/>
-      </p:ext>
-    </p:extLst>
-  </p:cSld>
-  <p:clrMapOvr>
-    <a:masterClrMapping/>
-  </p:clrMapOvr>
-</p:sld>
-</file>
-
-<file path=ppt/slides/slide21.xml><?xml version="1.0" encoding="utf-8"?>
-<p:sld xmlns:a="http://schemas.openxmlformats.org/drawingml/2006/main" xmlns:r="http://schemas.openxmlformats.org/officeDocument/2006/relationships" xmlns:p="http://schemas.openxmlformats.org/presentationml/2006/main">
-  <p:cSld>
-    <p:spTree>
-      <p:nvGrpSpPr>
-        <p:cNvPr id="1" name=""/>
-        <p:cNvGrpSpPr/>
-        <p:nvPr/>
-      </p:nvGrpSpPr>
-      <p:grpSpPr>
-        <a:xfrm>
-          <a:off x="0" y="0"/>
-          <a:ext cx="0" cy="0"/>
-          <a:chOff x="0" y="0"/>
-          <a:chExt cx="0" cy="0"/>
-        </a:xfrm>
-      </p:grpSpPr>
-      <p:sp>
-        <p:nvSpPr>
-          <p:cNvPr id="4" name="AutoShape 2" descr="Pietro.png"/>
-          <p:cNvSpPr>
-            <a:spLocks noChangeAspect="1" noChangeArrowheads="1"/>
-          </p:cNvSpPr>
-          <p:nvPr/>
-        </p:nvSpPr>
-        <p:spPr bwMode="auto">
-          <a:xfrm>
-            <a:off x="155575" y="-144463"/>
-            <a:ext cx="304800" cy="304801"/>
-          </a:xfrm>
-          <a:prstGeom prst="rect">
-            <a:avLst/>
-          </a:prstGeom>
-          <a:noFill/>
-          <a:extLst>
-            <a:ext uri="{909E8E84-426E-40DD-AFC4-6F175D3DCCD1}">
-              <a14:hiddenFill xmlns:a14="http://schemas.microsoft.com/office/drawing/2010/main">
-                <a:solidFill>
-                  <a:srgbClr val="FFFFFF"/>
-                </a:solidFill>
-              </a14:hiddenFill>
-            </a:ext>
-          </a:extLst>
-        </p:spPr>
-        <p:txBody>
-          <a:bodyPr vert="horz" wrap="square" lIns="91440" tIns="45720" rIns="91440" bIns="45720" numCol="1" anchor="t" anchorCtr="0" compatLnSpc="1">
-            <a:prstTxWarp prst="textNoShape">
-              <a:avLst/>
-            </a:prstTxWarp>
-          </a:bodyPr>
-          <a:lstStyle/>
-          <a:p>
-            <a:endParaRPr lang="nl-BE"/>
-          </a:p>
-        </p:txBody>
-      </p:sp>
-      <p:sp>
-        <p:nvSpPr>
-          <p:cNvPr id="11" name="Titel 1"/>
-          <p:cNvSpPr txBox="1">
-            <a:spLocks/>
-          </p:cNvSpPr>
-          <p:nvPr/>
-        </p:nvSpPr>
-        <p:spPr>
-          <a:xfrm>
-            <a:off x="685800" y="2391327"/>
-            <a:ext cx="7772400" cy="1829761"/>
-          </a:xfrm>
-          <a:prstGeom prst="rect">
-            <a:avLst/>
-          </a:prstGeom>
-        </p:spPr>
-        <p:txBody>
-          <a:bodyPr vert="horz" rtlCol="0" anchor="ctr">
-            <a:normAutofit fontScale="97500"/>
-            <a:scene3d>
-              <a:camera prst="orthographicFront"/>
-              <a:lightRig rig="soft" dir="t"/>
-            </a:scene3d>
-            <a:sp3d prstMaterial="softEdge">
-              <a:bevelT w="25400" h="25400"/>
-            </a:sp3d>
-          </a:bodyPr>
-          <a:lstStyle>
-            <a:lvl1pPr algn="l" rtl="0" eaLnBrk="1" latinLnBrk="0" hangingPunct="1">
-              <a:spcBef>
-                <a:spcPct val="0"/>
-              </a:spcBef>
-              <a:buNone/>
-              <a:defRPr kumimoji="0" sz="4100" b="1" kern="1200">
-                <a:solidFill>
-                  <a:schemeClr val="tx2"/>
-                </a:solidFill>
-                <a:effectLst>
-                  <a:outerShdw blurRad="31750" dist="25400" dir="5400000" algn="tl" rotWithShape="0">
-                    <a:srgbClr val="000000">
-                      <a:alpha val="25000"/>
-                    </a:srgbClr>
-                  </a:outerShdw>
-                </a:effectLst>
-                <a:latin typeface="+mj-lt"/>
-                <a:ea typeface="+mj-ea"/>
-                <a:cs typeface="+mj-cs"/>
-              </a:defRPr>
-            </a:lvl1pPr>
-            <a:extLst/>
-          </a:lstStyle>
-          <a:p>
-            <a:pPr algn="ctr"/>
-            <a:r>
-              <a:rPr lang="en-US" sz="4500" dirty="0" smtClean="0"/>
-              <a:t>Questions</a:t>
-            </a:r>
-            <a:r>
-              <a:rPr lang="en-US" dirty="0" smtClean="0"/>
-              <a:t>?</a:t>
-            </a:r>
-            <a:endParaRPr lang="nl-BE" dirty="0"/>
-          </a:p>
-        </p:txBody>
-      </p:sp>
-    </p:spTree>
-    <p:extLst>
-      <p:ext uri="{BB962C8B-B14F-4D97-AF65-F5344CB8AC3E}">
-        <p14:creationId xmlns:p14="http://schemas.microsoft.com/office/powerpoint/2010/main" val="3256963629"/>
-      </p:ext>
-    </p:extLst>
-  </p:cSld>
-  <p:clrMapOvr>
-    <a:masterClrMapping/>
-  </p:clrMapOvr>
-</p:sld>
-</file>
-
 <file path=ppt/slides/slide3.xml><?xml version="1.0" encoding="utf-8"?>
 <p:sld xmlns:a="http://schemas.openxmlformats.org/drawingml/2006/main" xmlns:r="http://schemas.openxmlformats.org/officeDocument/2006/relationships" xmlns:p="http://schemas.openxmlformats.org/presentationml/2006/main">
   <p:cSld>
@@ -8388,7 +8014,7 @@
           <a:lstStyle/>
           <a:p>
             <a:r>
-              <a:rPr lang="nl-BE" dirty="0" err="1" smtClean="0"/>
+              <a:rPr lang="nl-BE" dirty="0" err="1"/>
               <a:t>Bibliography</a:t>
             </a:r>
             <a:endParaRPr lang="nl-BE" dirty="0"/>
@@ -8422,11 +8048,7 @@
             </a:pPr>
             <a:r>
               <a:rPr lang="en-US" dirty="0"/>
-              <a:t>Lifted Reasoning for Combinatorial </a:t>
-            </a:r>
-            <a:r>
-              <a:rPr lang="en-US" dirty="0" smtClean="0"/>
-              <a:t>Counting</a:t>
+              <a:t>Lifted Reasoning for Combinatorial Counting</a:t>
             </a:r>
           </a:p>
           <a:p>
@@ -8437,11 +8059,7 @@
             </a:pPr>
             <a:r>
               <a:rPr lang="en-US" dirty="0"/>
-              <a:t>Towards High-Level Probabilistic Reasoning with Lifted </a:t>
-            </a:r>
-            <a:r>
-              <a:rPr lang="en-US" dirty="0" smtClean="0"/>
-              <a:t>Inference</a:t>
+              <a:t>Towards High-Level Probabilistic Reasoning with Lifted Inference</a:t>
             </a:r>
           </a:p>
           <a:p>
@@ -8451,12 +8069,8 @@
               <a:buAutoNum type="arabicPeriod"/>
             </a:pPr>
             <a:r>
-              <a:rPr lang="en-US" dirty="0" smtClean="0"/>
-              <a:t>Constructing </a:t>
-            </a:r>
-            <a:r>
               <a:rPr lang="en-US" dirty="0"/>
-              <a:t>Area-Proportional Venn and Euler</a:t>
+              <a:t>Constructing Area-Proportional Venn and Euler</a:t>
             </a:r>
             <a:endParaRPr lang="nl-BE" dirty="0"/>
           </a:p>
@@ -8521,7 +8135,7 @@
               <a:t> </a:t>
             </a:r>
             <a:r>
-              <a:rPr lang="nl-BE" dirty="0" err="1" smtClean="0"/>
+              <a:rPr lang="nl-BE" dirty="0" err="1"/>
               <a:t>Reasoning</a:t>
             </a:r>
             <a:endParaRPr lang="nl-BE" dirty="0"/>
@@ -8567,55 +8181,50 @@
               <a:t>Inference</a:t>
             </a:r>
             <a:r>
-              <a:rPr lang="nl-BE" dirty="0" smtClean="0"/>
+              <a:rPr lang="nl-BE" dirty="0"/>
               <a:t>)</a:t>
             </a:r>
-            <a:endParaRPr lang="nl-BE" dirty="0" smtClean="0"/>
-          </a:p>
-          <a:p>
-            <a:r>
-              <a:rPr lang="nl-BE" dirty="0" err="1" smtClean="0"/>
+          </a:p>
+          <a:p>
+            <a:r>
+              <a:rPr lang="nl-BE" dirty="0" err="1"/>
               <a:t>Conditional</a:t>
             </a:r>
             <a:r>
-              <a:rPr lang="nl-BE" dirty="0" smtClean="0"/>
+              <a:rPr lang="nl-BE" dirty="0"/>
               <a:t> </a:t>
             </a:r>
             <a:r>
-              <a:rPr lang="nl-BE" dirty="0" err="1" smtClean="0"/>
+              <a:rPr lang="nl-BE" dirty="0" err="1"/>
               <a:t>Dependencies</a:t>
             </a:r>
             <a:endParaRPr lang="nl-BE" dirty="0"/>
           </a:p>
           <a:p>
             <a:r>
-              <a:rPr lang="nl-BE" dirty="0" smtClean="0"/>
-              <a:t>Traditional </a:t>
-            </a:r>
-            <a:r>
-              <a:rPr lang="nl-BE" dirty="0" smtClean="0"/>
-              <a:t>Model</a:t>
+              <a:rPr lang="nl-BE" dirty="0"/>
+              <a:t>Traditional Model</a:t>
             </a:r>
           </a:p>
           <a:p>
             <a:pPr lvl="1"/>
             <a:r>
-              <a:rPr lang="nl-BE" dirty="0" smtClean="0"/>
+              <a:rPr lang="nl-BE" dirty="0"/>
               <a:t>2 </a:t>
             </a:r>
             <a:r>
-              <a:rPr lang="nl-BE" dirty="0" err="1" smtClean="0"/>
+              <a:rPr lang="nl-BE" dirty="0" err="1"/>
               <a:t>Seperate</a:t>
             </a:r>
             <a:r>
-              <a:rPr lang="nl-BE" dirty="0" smtClean="0"/>
+              <a:rPr lang="nl-BE" dirty="0"/>
               <a:t> </a:t>
             </a:r>
             <a:r>
-              <a:rPr lang="nl-BE" dirty="0" err="1" smtClean="0"/>
+              <a:rPr lang="nl-BE" dirty="0" err="1"/>
               <a:t>functions</a:t>
             </a:r>
-            <a:endParaRPr lang="nl-BE" dirty="0" smtClean="0"/>
+            <a:endParaRPr lang="nl-BE" dirty="0"/>
           </a:p>
           <a:p>
             <a:pPr lvl="1"/>
@@ -8632,64 +8241,55 @@
               <a:t> of </a:t>
             </a:r>
             <a:r>
-              <a:rPr lang="nl-BE" dirty="0" err="1" smtClean="0"/>
+              <a:rPr lang="nl-BE" dirty="0" err="1"/>
               <a:t>symmetries</a:t>
             </a:r>
-            <a:endParaRPr lang="nl-BE" dirty="0" smtClean="0"/>
+            <a:endParaRPr lang="nl-BE" dirty="0"/>
           </a:p>
           <a:p>
             <a:pPr lvl="1"/>
             <a:r>
-              <a:rPr lang="nl-BE" dirty="0" err="1" smtClean="0"/>
+              <a:rPr lang="nl-BE" dirty="0" err="1"/>
               <a:t>Grounded</a:t>
             </a:r>
             <a:r>
-              <a:rPr lang="nl-BE" dirty="0" smtClean="0"/>
+              <a:rPr lang="nl-BE" dirty="0"/>
               <a:t> </a:t>
             </a:r>
             <a:r>
-              <a:rPr lang="nl-BE" dirty="0" err="1" smtClean="0"/>
+              <a:rPr lang="nl-BE" dirty="0" err="1"/>
               <a:t>Inference</a:t>
             </a:r>
-            <a:endParaRPr lang="nl-BE" dirty="0" smtClean="0"/>
-          </a:p>
-          <a:p>
-            <a:r>
-              <a:rPr lang="nl-BE" dirty="0" err="1" smtClean="0"/>
+            <a:endParaRPr lang="nl-BE" dirty="0"/>
+          </a:p>
+          <a:p>
+            <a:r>
+              <a:rPr lang="nl-BE" dirty="0" err="1"/>
               <a:t>Lifted</a:t>
             </a:r>
             <a:r>
-              <a:rPr lang="nl-BE" dirty="0" smtClean="0"/>
-              <a:t> </a:t>
-            </a:r>
-            <a:r>
-              <a:rPr lang="nl-BE" dirty="0" smtClean="0"/>
-              <a:t>Model</a:t>
+              <a:rPr lang="nl-BE" dirty="0"/>
+              <a:t> Model</a:t>
             </a:r>
           </a:p>
           <a:p>
             <a:pPr lvl="1"/>
             <a:r>
-              <a:rPr lang="nl-BE" dirty="0" err="1" smtClean="0"/>
+              <a:rPr lang="nl-BE" dirty="0" err="1"/>
               <a:t>Generalization</a:t>
             </a:r>
-            <a:endParaRPr lang="nl-BE" dirty="0" smtClean="0"/>
+            <a:endParaRPr lang="nl-BE" dirty="0"/>
           </a:p>
           <a:p>
             <a:pPr lvl="1"/>
             <a:r>
-              <a:rPr lang="nl-BE" dirty="0" err="1" smtClean="0"/>
+              <a:rPr lang="nl-BE" dirty="0" err="1"/>
               <a:t>Faster</a:t>
             </a:r>
             <a:r>
-              <a:rPr lang="nl-BE" dirty="0" smtClean="0"/>
-              <a:t> </a:t>
-            </a:r>
-            <a:r>
-              <a:rPr lang="nl-BE" dirty="0" smtClean="0"/>
-              <a:t>processing</a:t>
-            </a:r>
-            <a:endParaRPr lang="nl-BE" dirty="0" smtClean="0"/>
+              <a:rPr lang="nl-BE" dirty="0"/>
+              <a:t> processing</a:t>
+            </a:r>
           </a:p>
         </p:txBody>
       </p:sp>
@@ -8828,10 +8428,9 @@
           <a:lstStyle/>
           <a:p>
             <a:r>
-              <a:rPr lang="nl-BE" sz="2800" b="1" dirty="0" smtClean="0"/>
+              <a:rPr lang="nl-BE" sz="2800" b="1" dirty="0"/>
               <a:t>Company</a:t>
             </a:r>
-            <a:endParaRPr lang="nl-BE" sz="2800" b="1" dirty="0"/>
           </a:p>
         </p:txBody>
       </p:sp>
@@ -8858,10 +8457,9 @@
           <a:lstStyle/>
           <a:p>
             <a:r>
-              <a:rPr lang="nl-BE" sz="2800" b="1" dirty="0" smtClean="0"/>
+              <a:rPr lang="nl-BE" sz="2800" b="1" dirty="0"/>
               <a:t>Age</a:t>
             </a:r>
-            <a:endParaRPr lang="nl-BE" sz="2800" b="1" dirty="0"/>
           </a:p>
         </p:txBody>
       </p:sp>
@@ -8888,10 +8486,9 @@
           <a:lstStyle/>
           <a:p>
             <a:r>
-              <a:rPr lang="nl-BE" sz="2800" b="1" dirty="0" smtClean="0"/>
+              <a:rPr lang="nl-BE" sz="2800" b="1" dirty="0"/>
               <a:t>Age</a:t>
             </a:r>
-            <a:endParaRPr lang="nl-BE" sz="2800" b="1" dirty="0"/>
           </a:p>
         </p:txBody>
       </p:sp>
@@ -8918,10 +8515,9 @@
           <a:lstStyle/>
           <a:p>
             <a:r>
-              <a:rPr lang="nl-BE" sz="2800" b="1" dirty="0" smtClean="0"/>
+              <a:rPr lang="nl-BE" sz="2800" b="1" dirty="0"/>
               <a:t>Age</a:t>
             </a:r>
-            <a:endParaRPr lang="nl-BE" sz="2800" b="1" dirty="0"/>
           </a:p>
         </p:txBody>
       </p:sp>
@@ -9082,11 +8678,11 @@
           <a:lstStyle/>
           <a:p>
             <a:r>
-              <a:rPr lang="nl-BE" dirty="0" err="1" smtClean="0"/>
+              <a:rPr lang="nl-BE" dirty="0" err="1"/>
               <a:t>Initial</a:t>
             </a:r>
             <a:r>
-              <a:rPr lang="nl-BE" dirty="0" smtClean="0"/>
+              <a:rPr lang="nl-BE" dirty="0"/>
               <a:t> </a:t>
             </a:r>
             <a:r>
@@ -9095,21 +8691,17 @@
             </a:r>
             <a:r>
               <a:rPr lang="nl-BE" dirty="0"/>
-              <a:t> (David Poole</a:t>
-            </a:r>
-            <a:r>
-              <a:rPr lang="nl-BE" dirty="0" smtClean="0"/>
-              <a:t>)</a:t>
+              <a:t> (David Poole)</a:t>
             </a:r>
           </a:p>
           <a:p>
             <a:pPr lvl="1"/>
             <a:r>
-              <a:rPr lang="nl-BE" dirty="0" smtClean="0"/>
+              <a:rPr lang="nl-BE" dirty="0"/>
               <a:t>High-level </a:t>
             </a:r>
             <a:r>
-              <a:rPr lang="nl-BE" dirty="0" err="1" smtClean="0"/>
+              <a:rPr lang="nl-BE" dirty="0" err="1"/>
               <a:t>Reasoning</a:t>
             </a:r>
             <a:endParaRPr lang="nl-BE" dirty="0"/>
@@ -9127,25 +8719,24 @@
               <a:t>Machine </a:t>
             </a:r>
             <a:r>
-              <a:rPr lang="nl-BE" dirty="0" err="1" smtClean="0"/>
+              <a:rPr lang="nl-BE" dirty="0" err="1"/>
               <a:t>learning</a:t>
             </a:r>
-            <a:endParaRPr lang="nl-BE" dirty="0" smtClean="0"/>
-          </a:p>
-          <a:p>
-            <a:r>
-              <a:rPr lang="nl-BE" dirty="0" err="1" smtClean="0"/>
+            <a:endParaRPr lang="nl-BE" dirty="0"/>
+          </a:p>
+          <a:p>
+            <a:r>
+              <a:rPr lang="nl-BE" dirty="0" err="1"/>
               <a:t>Now</a:t>
             </a:r>
             <a:r>
-              <a:rPr lang="nl-BE" dirty="0" smtClean="0"/>
+              <a:rPr lang="nl-BE" dirty="0"/>
               <a:t>: Combinatorics</a:t>
             </a:r>
+          </a:p>
+          <a:p>
+            <a:pPr lvl="1"/>
             <a:endParaRPr lang="nl-BE" dirty="0"/>
-          </a:p>
-          <a:p>
-            <a:pPr lvl="1"/>
-            <a:endParaRPr lang="nl-BE" dirty="0" smtClean="0"/>
           </a:p>
         </p:txBody>
       </p:sp>
@@ -9376,7 +8967,7 @@
               <a:t>Mathematical </a:t>
             </a:r>
             <a:r>
-              <a:rPr lang="nl-BE" dirty="0" err="1" smtClean="0"/>
+              <a:rPr lang="nl-BE" dirty="0" err="1"/>
               <a:t>Formulas</a:t>
             </a:r>
             <a:endParaRPr lang="nl-BE" dirty="0"/>
@@ -10711,8 +10302,8 @@
           <a:chExt cx="0" cy="0"/>
         </a:xfrm>
       </p:grpSpPr>
-      <mc:AlternateContent xmlns:mc="http://schemas.openxmlformats.org/markup-compatibility/2006" xmlns:a14="http://schemas.microsoft.com/office/drawing/2010/main">
-        <mc:Choice Requires="a14">
+      <mc:AlternateContent xmlns:mc="http://schemas.openxmlformats.org/markup-compatibility/2006">
+        <mc:Choice xmlns:a14="http://schemas.microsoft.com/office/drawing/2010/main" Requires="a14">
           <p:sp>
             <p:nvSpPr>
               <p:cNvPr id="2" name="Tijdelijke aanduiding voor inhoud 1"/>
@@ -10725,22 +10316,28 @@
             </p:nvSpPr>
             <p:spPr/>
             <p:txBody>
-              <a:bodyPr/>
+              <a:bodyPr>
+                <a:normAutofit fontScale="92500" lnSpcReduction="10000"/>
+              </a:bodyPr>
               <a:lstStyle/>
               <a:p>
                 <a:r>
                   <a:rPr lang="nl-BE" dirty="0"/>
-                  <a:t>Constraint Satisfaction Problem (CSP) </a:t>
+                  <a:t>Counting Constraint Satisfaction Problem (#CSP) </a:t>
                 </a:r>
                 <a14:m>
                   <m:oMath xmlns:m="http://schemas.openxmlformats.org/officeDocument/2006/math">
+                    <m:r>
+                      <a:rPr lang="nl-BE" i="1">
+                        <a:latin typeface="Cambria Math" panose="02040503050406030204" pitchFamily="18" charset="0"/>
+                      </a:rPr>
+                      <m:t>𝑀𝐶</m:t>
+                    </m:r>
                     <m:d>
                       <m:dPr>
-                        <m:begChr m:val="⟨"/>
-                        <m:endChr m:val="⟩"/>
                         <m:ctrlPr>
                           <a:rPr lang="nl-BE" i="1">
-                            <a:latin typeface="Cambria Math"/>
+                            <a:latin typeface="Cambria Math" panose="02040503050406030204" pitchFamily="18" charset="0"/>
                           </a:rPr>
                         </m:ctrlPr>
                       </m:dPr>
@@ -10784,13 +10381,13 @@
               <a:p>
                 <a:pPr lvl="1"/>
                 <a:r>
-                  <a:rPr lang="nl-BE" b="0" dirty="0"/>
+                  <a:rPr lang="nl-BE" dirty="0"/>
                   <a:t>Set of variables </a:t>
                 </a:r>
                 <a14:m>
                   <m:oMath xmlns:m="http://schemas.openxmlformats.org/officeDocument/2006/math">
                     <m:r>
-                      <a:rPr lang="nl-BE" b="0" i="1" smtClean="0">
+                      <a:rPr lang="nl-BE" i="1">
                         <a:latin typeface="Cambria Math" panose="02040503050406030204" pitchFamily="18" charset="0"/>
                       </a:rPr>
                       <m:t>𝑉</m:t>
@@ -10808,7 +10405,7 @@
                 <a14:m>
                   <m:oMath xmlns:m="http://schemas.openxmlformats.org/officeDocument/2006/math">
                     <m:r>
-                      <a:rPr lang="nl-BE" b="0" i="1" smtClean="0">
+                      <a:rPr lang="nl-BE" i="1">
                         <a:latin typeface="Cambria Math" panose="02040503050406030204" pitchFamily="18" charset="0"/>
                       </a:rPr>
                       <m:t>𝐷</m:t>
@@ -10826,7 +10423,7 @@
                 <a14:m>
                   <m:oMath xmlns:m="http://schemas.openxmlformats.org/officeDocument/2006/math">
                     <m:r>
-                      <a:rPr lang="nl-BE" b="0" i="1" smtClean="0">
+                      <a:rPr lang="nl-BE" i="1">
                         <a:latin typeface="Cambria Math" panose="02040503050406030204" pitchFamily="18" charset="0"/>
                       </a:rPr>
                       <m:t>𝐶</m:t>
@@ -10838,39 +10435,25 @@
               <a:p>
                 <a:r>
                   <a:rPr lang="nl-BE" dirty="0"/>
+                  <a:t>Goal: Find the number of satisfying assignments</a:t>
+                </a:r>
+              </a:p>
+              <a:p>
+                <a:pPr lvl="1"/>
+                <a:r>
+                  <a:rPr lang="nl-BE" dirty="0"/>
                   <a:t>Assignment </a:t>
                 </a:r>
                 <a14:m>
                   <m:oMath xmlns:m="http://schemas.openxmlformats.org/officeDocument/2006/math">
                     <m:r>
-                      <a:rPr lang="nl-BE" b="0" i="1" smtClean="0">
-                        <a:latin typeface="Cambria Math" panose="02040503050406030204" pitchFamily="18" charset="0"/>
-                      </a:rPr>
-                      <m:t>𝑓</m:t>
-                    </m:r>
-                  </m:oMath>
-                </a14:m>
-                <a:r>
-                  <a:rPr lang="nl-BE" i="1" dirty="0"/>
-                  <a:t> </a:t>
-                </a:r>
-                <a:r>
-                  <a:rPr lang="nl-BE" dirty="0"/>
-                  <a:t>satisfies a CSP</a:t>
-                </a:r>
-              </a:p>
-              <a:p>
-                <a:pPr lvl="1"/>
-                <a14:m>
-                  <m:oMath xmlns:m="http://schemas.openxmlformats.org/officeDocument/2006/math">
-                    <m:r>
-                      <a:rPr lang="nl-BE" b="0" i="1" dirty="0" smtClean="0">
+                      <a:rPr lang="nl-BE" i="1" dirty="0">
                         <a:latin typeface="Cambria Math" panose="02040503050406030204" pitchFamily="18" charset="0"/>
                       </a:rPr>
                       <m:t>𝑓</m:t>
                     </m:r>
                     <m:r>
-                      <a:rPr lang="nl-BE" b="0" i="1" dirty="0" smtClean="0">
+                      <a:rPr lang="nl-BE" i="1" dirty="0">
                         <a:latin typeface="Cambria Math" panose="02040503050406030204" pitchFamily="18" charset="0"/>
                       </a:rPr>
                       <m:t> </m:t>
@@ -10884,19 +10467,30 @@
                 <a14:m>
                   <m:oMath xmlns:m="http://schemas.openxmlformats.org/officeDocument/2006/math">
                     <m:r>
-                      <a:rPr lang="nl-BE" b="0" i="1" smtClean="0">
+                      <a:rPr lang="nl-BE" i="1">
                         <a:latin typeface="Cambria Math" panose="02040503050406030204" pitchFamily="18" charset="0"/>
                       </a:rPr>
                       <m:t>𝐶</m:t>
                     </m:r>
                   </m:oMath>
                 </a14:m>
-                <a:endParaRPr lang="nl-BE" b="0" dirty="0"/>
+                <a:endParaRPr lang="nl-BE" dirty="0"/>
+              </a:p>
+              <a:p>
+                <a:pPr lvl="2"/>
+                <a:endParaRPr lang="nl-BE" dirty="0"/>
               </a:p>
               <a:p>
                 <a:r>
                   <a:rPr lang="nl-BE" dirty="0"/>
-                  <a:t>Goal: does a satisfying </a:t>
+                  <a:t>Combinatorics problems can be expressed as #CSPs</a:t>
+                </a:r>
+              </a:p>
+              <a:p>
+                <a:pPr lvl="1"/>
+                <a:r>
+                  <a:rPr lang="nl-BE" dirty="0"/>
+                  <a:t>Set </a:t>
                 </a:r>
                 <a14:m>
                   <m:oMath xmlns:m="http://schemas.openxmlformats.org/officeDocument/2006/math">
@@ -10904,87 +10498,55 @@
                       <a:rPr lang="nl-BE" b="0" i="1" smtClean="0">
                         <a:latin typeface="Cambria Math" panose="02040503050406030204" pitchFamily="18" charset="0"/>
                       </a:rPr>
-                      <m:t>𝑓</m:t>
+                      <m:t>𝑋</m:t>
                     </m:r>
                   </m:oMath>
                 </a14:m>
                 <a:r>
                   <a:rPr lang="nl-BE" dirty="0"/>
-                  <a:t> exist?</a:t>
+                  <a:t> </a:t>
+                </a:r>
+                <a:r>
+                  <a:rPr lang="nl-BE" dirty="0">
+                    <a:sym typeface="Wingdings" pitchFamily="2" charset="2"/>
+                  </a:rPr>
+                  <a:t> set of variables</a:t>
                 </a:r>
               </a:p>
               <a:p>
                 <a:pPr lvl="1"/>
                 <a:r>
-                  <a:rPr lang="nl-BE" dirty="0"/>
-                  <a:t>Also called a model </a:t>
+                  <a:rPr lang="nl-BE" dirty="0">
+                    <a:sym typeface="Wingdings" pitchFamily="2" charset="2"/>
+                  </a:rPr>
+                  <a:t>Set </a:t>
                 </a:r>
                 <a14:m>
                   <m:oMath xmlns:m="http://schemas.openxmlformats.org/officeDocument/2006/math">
                     <m:r>
                       <a:rPr lang="nl-BE" b="0" i="1" smtClean="0">
                         <a:latin typeface="Cambria Math" panose="02040503050406030204" pitchFamily="18" charset="0"/>
+                        <a:sym typeface="Wingdings" pitchFamily="2" charset="2"/>
                       </a:rPr>
-                      <m:t>𝑀</m:t>
+                      <m:t>𝑌</m:t>
                     </m:r>
-                    <m:d>
-                      <m:dPr>
-                        <m:begChr m:val="⟨"/>
-                        <m:endChr m:val="⟩"/>
-                        <m:ctrlPr>
-                          <a:rPr lang="nl-BE" b="0" i="1" smtClean="0">
-                            <a:latin typeface="Cambria Math"/>
-                          </a:rPr>
-                        </m:ctrlPr>
-                      </m:dPr>
-                      <m:e>
-                        <m:r>
-                          <a:rPr lang="nl-BE" b="0" i="1" smtClean="0">
-                            <a:latin typeface="Cambria Math" panose="02040503050406030204" pitchFamily="18" charset="0"/>
-                          </a:rPr>
-                          <m:t>𝑉</m:t>
-                        </m:r>
-                        <m:r>
-                          <a:rPr lang="nl-BE" b="0" i="1" smtClean="0">
-                            <a:latin typeface="Cambria Math" panose="02040503050406030204" pitchFamily="18" charset="0"/>
-                          </a:rPr>
-                          <m:t>,</m:t>
-                        </m:r>
-                        <m:r>
-                          <a:rPr lang="nl-BE" b="0" i="1" smtClean="0">
-                            <a:latin typeface="Cambria Math" panose="02040503050406030204" pitchFamily="18" charset="0"/>
-                          </a:rPr>
-                          <m:t>𝐷</m:t>
-                        </m:r>
-                        <m:r>
-                          <a:rPr lang="nl-BE" b="0" i="1" smtClean="0">
-                            <a:latin typeface="Cambria Math" panose="02040503050406030204" pitchFamily="18" charset="0"/>
-                          </a:rPr>
-                          <m:t>,</m:t>
-                        </m:r>
-                        <m:r>
-                          <a:rPr lang="nl-BE" b="0" i="1" smtClean="0">
-                            <a:latin typeface="Cambria Math" panose="02040503050406030204" pitchFamily="18" charset="0"/>
-                          </a:rPr>
-                          <m:t>𝐶</m:t>
-                        </m:r>
-                      </m:e>
-                    </m:d>
                   </m:oMath>
                 </a14:m>
                 <a:r>
                   <a:rPr lang="nl-BE" dirty="0"/>
-                  <a:t> or solution</a:t>
+                  <a:t> </a:t>
                 </a:r>
-              </a:p>
-              <a:p>
-                <a:pPr lvl="1"/>
-                <a:endParaRPr lang="nl-BE" dirty="0"/>
+                <a:r>
+                  <a:rPr lang="nl-BE" dirty="0">
+                    <a:sym typeface="Wingdings" pitchFamily="2" charset="2"/>
+                  </a:rPr>
+                  <a:t> domain</a:t>
+                </a:r>
               </a:p>
             </p:txBody>
           </p:sp>
         </mc:Choice>
-        <mc:Fallback xmlns="">
+        <mc:Fallback>
           <p:sp>
             <p:nvSpPr>
               <p:cNvPr id="2" name="Tijdelijke aanduiding voor inhoud 1"/>
@@ -10999,7 +10561,7 @@
               <a:blipFill>
                 <a:blip r:embed="rId2"/>
                 <a:stretch>
-                  <a:fillRect t="-1120"/>
+                  <a:fillRect t="-1681"/>
                 </a:stretch>
               </a:blipFill>
             </p:spPr>
@@ -11035,7 +10597,7 @@
           <a:p>
             <a:r>
               <a:rPr lang="nl-BE" dirty="0"/>
-              <a:t>CSP</a:t>
+              <a:t>#CSP</a:t>
             </a:r>
           </a:p>
         </p:txBody>
@@ -11043,7 +10605,7 @@
     </p:spTree>
     <p:extLst>
       <p:ext uri="{BB962C8B-B14F-4D97-AF65-F5344CB8AC3E}">
-        <p14:creationId xmlns:p14="http://schemas.microsoft.com/office/powerpoint/2010/main" val="3748111677"/>
+        <p14:creationId xmlns:p14="http://schemas.microsoft.com/office/powerpoint/2010/main" val="281160088"/>
       </p:ext>
     </p:extLst>
   </p:cSld>

</xml_diff>